<commit_message>
Update Math Investigation presentation with latest changes
</commit_message>
<xml_diff>
--- a/presentation/Math_Investigation_Presentation.pptx
+++ b/presentation/Math_Investigation_Presentation.pptx
@@ -6,19 +6,20 @@
   </p:sldMasterIdLst>
   <p:sldIdLst>
     <p:sldId id="256" r:id="rId2"/>
-    <p:sldId id="269" r:id="rId3"/>
-    <p:sldId id="257" r:id="rId4"/>
-    <p:sldId id="258" r:id="rId5"/>
-    <p:sldId id="259" r:id="rId6"/>
-    <p:sldId id="260" r:id="rId7"/>
-    <p:sldId id="261" r:id="rId8"/>
-    <p:sldId id="262" r:id="rId9"/>
-    <p:sldId id="263" r:id="rId10"/>
-    <p:sldId id="264" r:id="rId11"/>
-    <p:sldId id="265" r:id="rId12"/>
-    <p:sldId id="266" r:id="rId13"/>
-    <p:sldId id="267" r:id="rId14"/>
-    <p:sldId id="268" r:id="rId15"/>
+    <p:sldId id="268" r:id="rId3"/>
+    <p:sldId id="269" r:id="rId4"/>
+    <p:sldId id="270" r:id="rId5"/>
+    <p:sldId id="257" r:id="rId6"/>
+    <p:sldId id="258" r:id="rId7"/>
+    <p:sldId id="259" r:id="rId8"/>
+    <p:sldId id="260" r:id="rId9"/>
+    <p:sldId id="261" r:id="rId10"/>
+    <p:sldId id="262" r:id="rId11"/>
+    <p:sldId id="263" r:id="rId12"/>
+    <p:sldId id="264" r:id="rId13"/>
+    <p:sldId id="265" r:id="rId14"/>
+    <p:sldId id="266" r:id="rId15"/>
+    <p:sldId id="267" r:id="rId16"/>
   </p:sldIdLst>
   <p:sldSz cx="9144000" cy="6858000" type="screen4x3"/>
   <p:notesSz cx="6858000" cy="9144000"/>
@@ -315,7 +316,7 @@
           <a:p>
             <a:fld id="{5BCAD085-E8A6-8845-BD4E-CB4CCA059FC4}" type="datetimeFigureOut">
               <a:rPr lang="en-US" smtClean="0"/>
-              <a:t>5/5/2025</a:t>
+              <a:t>5/8/2025</a:t>
             </a:fld>
             <a:endParaRPr lang="en-US"/>
           </a:p>
@@ -483,7 +484,7 @@
           <a:p>
             <a:fld id="{5BCAD085-E8A6-8845-BD4E-CB4CCA059FC4}" type="datetimeFigureOut">
               <a:rPr lang="en-US" smtClean="0"/>
-              <a:t>5/5/2025</a:t>
+              <a:t>5/8/2025</a:t>
             </a:fld>
             <a:endParaRPr lang="en-US"/>
           </a:p>
@@ -661,7 +662,7 @@
           <a:p>
             <a:fld id="{5BCAD085-E8A6-8845-BD4E-CB4CCA059FC4}" type="datetimeFigureOut">
               <a:rPr lang="en-US" smtClean="0"/>
-              <a:t>5/5/2025</a:t>
+              <a:t>5/8/2025</a:t>
             </a:fld>
             <a:endParaRPr lang="en-US"/>
           </a:p>
@@ -829,7 +830,7 @@
           <a:p>
             <a:fld id="{5BCAD085-E8A6-8845-BD4E-CB4CCA059FC4}" type="datetimeFigureOut">
               <a:rPr lang="en-US" smtClean="0"/>
-              <a:t>5/5/2025</a:t>
+              <a:t>5/8/2025</a:t>
             </a:fld>
             <a:endParaRPr lang="en-US"/>
           </a:p>
@@ -1074,7 +1075,7 @@
           <a:p>
             <a:fld id="{5BCAD085-E8A6-8845-BD4E-CB4CCA059FC4}" type="datetimeFigureOut">
               <a:rPr lang="en-US" smtClean="0"/>
-              <a:t>5/5/2025</a:t>
+              <a:t>5/8/2025</a:t>
             </a:fld>
             <a:endParaRPr lang="en-US"/>
           </a:p>
@@ -1359,7 +1360,7 @@
           <a:p>
             <a:fld id="{5BCAD085-E8A6-8845-BD4E-CB4CCA059FC4}" type="datetimeFigureOut">
               <a:rPr lang="en-US" smtClean="0"/>
-              <a:t>5/5/2025</a:t>
+              <a:t>5/8/2025</a:t>
             </a:fld>
             <a:endParaRPr lang="en-US"/>
           </a:p>
@@ -1778,7 +1779,7 @@
           <a:p>
             <a:fld id="{5BCAD085-E8A6-8845-BD4E-CB4CCA059FC4}" type="datetimeFigureOut">
               <a:rPr lang="en-US" smtClean="0"/>
-              <a:t>5/5/2025</a:t>
+              <a:t>5/8/2025</a:t>
             </a:fld>
             <a:endParaRPr lang="en-US"/>
           </a:p>
@@ -1895,7 +1896,7 @@
           <a:p>
             <a:fld id="{5BCAD085-E8A6-8845-BD4E-CB4CCA059FC4}" type="datetimeFigureOut">
               <a:rPr lang="en-US" smtClean="0"/>
-              <a:t>5/5/2025</a:t>
+              <a:t>5/8/2025</a:t>
             </a:fld>
             <a:endParaRPr lang="en-US"/>
           </a:p>
@@ -1990,7 +1991,7 @@
           <a:p>
             <a:fld id="{5BCAD085-E8A6-8845-BD4E-CB4CCA059FC4}" type="datetimeFigureOut">
               <a:rPr lang="en-US" smtClean="0"/>
-              <a:t>5/5/2025</a:t>
+              <a:t>5/8/2025</a:t>
             </a:fld>
             <a:endParaRPr lang="en-US"/>
           </a:p>
@@ -2265,7 +2266,7 @@
           <a:p>
             <a:fld id="{5BCAD085-E8A6-8845-BD4E-CB4CCA059FC4}" type="datetimeFigureOut">
               <a:rPr lang="en-US" smtClean="0"/>
-              <a:t>5/5/2025</a:t>
+              <a:t>5/8/2025</a:t>
             </a:fld>
             <a:endParaRPr lang="en-US"/>
           </a:p>
@@ -2517,7 +2518,7 @@
           <a:p>
             <a:fld id="{5BCAD085-E8A6-8845-BD4E-CB4CCA059FC4}" type="datetimeFigureOut">
               <a:rPr lang="en-US" smtClean="0"/>
-              <a:t>5/5/2025</a:t>
+              <a:t>5/8/2025</a:t>
             </a:fld>
             <a:endParaRPr lang="en-US"/>
           </a:p>
@@ -2728,7 +2729,7 @@
           <a:p>
             <a:fld id="{5BCAD085-E8A6-8845-BD4E-CB4CCA059FC4}" type="datetimeFigureOut">
               <a:rPr lang="en-US" smtClean="0"/>
-              <a:t>5/5/2025</a:t>
+              <a:t>5/8/2025</a:t>
             </a:fld>
             <a:endParaRPr lang="en-US"/>
           </a:p>
@@ -3615,78 +3616,483 @@
         </p:nvSpPr>
         <p:spPr/>
         <p:txBody>
-          <a:bodyPr/>
+          <a:bodyPr>
+            <a:normAutofit fontScale="90000"/>
+          </a:bodyPr>
           <a:lstStyle/>
           <a:p>
             <a:r>
-              <a:rPr dirty="0"/>
-              <a:t>Graph: Second Fission</a:t>
+              <a:t>Module 5: Fission Frequency Simulation</a:t>
             </a:r>
           </a:p>
         </p:txBody>
       </p:sp>
       <p:sp>
         <p:nvSpPr>
-          <p:cNvPr id="3" name="Content Placeholder 2"/>
+          <p:cNvPr id="4" name="Rectangle 1">
+            <a:extLst>
+              <a:ext uri="{FF2B5EF4-FFF2-40B4-BE49-F238E27FC236}">
+                <a16:creationId xmlns:a16="http://schemas.microsoft.com/office/drawing/2014/main" id="{4F1BA8A6-0D54-C77E-15A9-C1167C69C0CC}"/>
+              </a:ext>
+            </a:extLst>
+          </p:cNvPr>
           <p:cNvSpPr>
-            <a:spLocks noGrp="1"/>
+            <a:spLocks noChangeArrowheads="1"/>
           </p:cNvSpPr>
-          <p:nvPr>
-            <p:ph idx="1"/>
-          </p:nvPr>
+          <p:nvPr/>
         </p:nvSpPr>
-        <p:spPr/>
-        <p:txBody>
-          <a:bodyPr/>
-          <a:lstStyle/>
-          <a:p>
-            <a:r>
-              <a:rPr dirty="0"/>
-              <a:t>Growth step</a:t>
-            </a:r>
-            <a:r>
-              <a:rPr lang="en-US" dirty="0"/>
-              <a:t> dots</a:t>
-            </a:r>
-            <a:r>
-              <a:rPr dirty="0"/>
-              <a:t> are almost invisible without </a:t>
-            </a:r>
-            <a:r>
-              <a:rPr lang="en-US" dirty="0"/>
-              <a:t>inset zoom in lower right</a:t>
-            </a:r>
-            <a:r>
-              <a:rPr dirty="0"/>
-              <a:t>.</a:t>
-            </a:r>
-          </a:p>
-        </p:txBody>
-      </p:sp>
-      <p:pic>
-        <p:nvPicPr>
-          <p:cNvPr id="4" name="Picture 3" descr="Monday_10-17_second.png"/>
-          <p:cNvPicPr>
-            <a:picLocks noChangeAspect="1"/>
-          </p:cNvPicPr>
-          <p:nvPr/>
-        </p:nvPicPr>
-        <p:blipFill>
-          <a:blip r:embed="rId2"/>
-          <a:stretch>
-            <a:fillRect/>
-          </a:stretch>
-        </p:blipFill>
-        <p:spPr>
+        <p:spPr bwMode="auto">
           <a:xfrm>
-            <a:off x="574157" y="2649316"/>
-            <a:ext cx="7995685" cy="3997843"/>
+            <a:off x="281763" y="1709995"/>
+            <a:ext cx="8580474" cy="3970318"/>
           </a:xfrm>
           <a:prstGeom prst="rect">
             <a:avLst/>
           </a:prstGeom>
+          <a:noFill/>
+          <a:ln>
+            <a:noFill/>
+          </a:ln>
+          <a:effectLst/>
+          <a:extLst>
+            <a:ext uri="{909E8E84-426E-40DD-AFC4-6F175D3DCCD1}">
+              <a14:hiddenFill xmlns:a14="http://schemas.microsoft.com/office/drawing/2010/main">
+                <a:solidFill>
+                  <a:schemeClr val="accent1"/>
+                </a:solidFill>
+              </a14:hiddenFill>
+            </a:ext>
+            <a:ext uri="{91240B29-F687-4F45-9708-019B960494DF}">
+              <a14:hiddenLine xmlns:a14="http://schemas.microsoft.com/office/drawing/2010/main" w="9525">
+                <a:solidFill>
+                  <a:schemeClr val="tx1"/>
+                </a:solidFill>
+                <a:miter lim="800000"/>
+                <a:headEnd/>
+                <a:tailEnd/>
+              </a14:hiddenLine>
+            </a:ext>
+            <a:ext uri="{AF507438-7753-43E0-B8FC-AC1667EBCBE1}">
+              <a14:hiddenEffects xmlns:a14="http://schemas.microsoft.com/office/drawing/2010/main">
+                <a:effectLst>
+                  <a:outerShdw dist="35921" dir="2700000" algn="ctr" rotWithShape="0">
+                    <a:schemeClr val="bg2"/>
+                  </a:outerShdw>
+                </a:effectLst>
+              </a14:hiddenEffects>
+            </a:ext>
+          </a:extLst>
         </p:spPr>
-      </p:pic>
+        <p:txBody>
+          <a:bodyPr vert="horz" wrap="square" lIns="91440" tIns="45720" rIns="91440" bIns="45720" numCol="1" anchor="ctr" anchorCtr="0" compatLnSpc="1">
+            <a:prstTxWarp prst="textNoShape">
+              <a:avLst/>
+            </a:prstTxWarp>
+            <a:spAutoFit/>
+          </a:bodyPr>
+          <a:lstStyle/>
+          <a:p>
+            <a:pPr marL="0" marR="0" lvl="0" indent="0" algn="l" defTabSz="914400" rtl="0" eaLnBrk="0" fontAlgn="base" latinLnBrk="0" hangingPunct="0">
+              <a:lnSpc>
+                <a:spcPct val="100000"/>
+              </a:lnSpc>
+              <a:spcBef>
+                <a:spcPct val="0"/>
+              </a:spcBef>
+              <a:spcAft>
+                <a:spcPct val="0"/>
+              </a:spcAft>
+              <a:buClrTx/>
+              <a:buSzTx/>
+              <a:buFontTx/>
+              <a:buNone/>
+              <a:tabLst/>
+            </a:pPr>
+            <a:r>
+              <a:rPr kumimoji="0" lang="en-US" altLang="en-US" sz="1800" b="0" i="0" u="none" strike="noStrike" cap="none" normalizeH="0" baseline="0" dirty="0">
+                <a:ln>
+                  <a:noFill/>
+                </a:ln>
+                <a:solidFill>
+                  <a:schemeClr val="tx1"/>
+                </a:solidFill>
+                <a:effectLst/>
+                <a:latin typeface="Arial" panose="020B0604020202020204" pitchFamily="34" charset="0"/>
+              </a:rPr>
+              <a:t>This module models how population growth changes when the frequency of fission events increases.</a:t>
+            </a:r>
+          </a:p>
+          <a:p>
+            <a:pPr marL="0" marR="0" lvl="0" indent="0" algn="l" defTabSz="914400" rtl="0" eaLnBrk="0" fontAlgn="base" latinLnBrk="0" hangingPunct="0">
+              <a:lnSpc>
+                <a:spcPct val="100000"/>
+              </a:lnSpc>
+              <a:spcBef>
+                <a:spcPct val="0"/>
+              </a:spcBef>
+              <a:spcAft>
+                <a:spcPct val="0"/>
+              </a:spcAft>
+              <a:buClrTx/>
+              <a:buSzTx/>
+              <a:buFontTx/>
+              <a:buChar char="•"/>
+              <a:tabLst/>
+            </a:pPr>
+            <a:r>
+              <a:rPr kumimoji="0" lang="en-US" altLang="en-US" sz="1800" b="0" i="0" u="none" strike="noStrike" cap="none" normalizeH="0" baseline="0" dirty="0">
+                <a:ln>
+                  <a:noFill/>
+                </a:ln>
+                <a:solidFill>
+                  <a:schemeClr val="tx1"/>
+                </a:solidFill>
+                <a:effectLst/>
+                <a:latin typeface="Arial" panose="020B0604020202020204" pitchFamily="34" charset="0"/>
+              </a:rPr>
+              <a:t>The initial population is 1000 and the growth rate is 100% per day.</a:t>
+            </a:r>
+          </a:p>
+          <a:p>
+            <a:pPr marL="0" marR="0" lvl="0" indent="0" algn="l" defTabSz="914400" rtl="0" eaLnBrk="0" fontAlgn="base" latinLnBrk="0" hangingPunct="0">
+              <a:lnSpc>
+                <a:spcPct val="100000"/>
+              </a:lnSpc>
+              <a:spcBef>
+                <a:spcPct val="0"/>
+              </a:spcBef>
+              <a:spcAft>
+                <a:spcPct val="0"/>
+              </a:spcAft>
+              <a:buClrTx/>
+              <a:buSzTx/>
+              <a:buFontTx/>
+              <a:buChar char="•"/>
+              <a:tabLst/>
+            </a:pPr>
+            <a:r>
+              <a:rPr kumimoji="0" lang="en-US" altLang="en-US" sz="1800" b="0" i="0" u="none" strike="noStrike" cap="none" normalizeH="0" baseline="0" dirty="0">
+                <a:ln>
+                  <a:noFill/>
+                </a:ln>
+                <a:solidFill>
+                  <a:schemeClr val="tx1"/>
+                </a:solidFill>
+                <a:effectLst/>
+                <a:latin typeface="Arial" panose="020B0604020202020204" pitchFamily="34" charset="0"/>
+              </a:rPr>
+              <a:t>Fission intervals range from every 6 hours down to every second.</a:t>
+            </a:r>
+          </a:p>
+          <a:p>
+            <a:pPr marL="0" marR="0" lvl="0" indent="0" algn="l" defTabSz="914400" rtl="0" eaLnBrk="0" fontAlgn="base" latinLnBrk="0" hangingPunct="0">
+              <a:lnSpc>
+                <a:spcPct val="100000"/>
+              </a:lnSpc>
+              <a:spcBef>
+                <a:spcPct val="0"/>
+              </a:spcBef>
+              <a:spcAft>
+                <a:spcPct val="0"/>
+              </a:spcAft>
+              <a:buClrTx/>
+              <a:buSzTx/>
+              <a:buFontTx/>
+              <a:buChar char="•"/>
+              <a:tabLst/>
+            </a:pPr>
+            <a:r>
+              <a:rPr kumimoji="0" lang="en-US" altLang="en-US" sz="1800" b="0" i="0" u="none" strike="noStrike" cap="none" normalizeH="0" baseline="0" dirty="0">
+                <a:ln>
+                  <a:noFill/>
+                </a:ln>
+                <a:solidFill>
+                  <a:schemeClr val="tx1"/>
+                </a:solidFill>
+                <a:effectLst/>
+                <a:latin typeface="Arial" panose="020B0604020202020204" pitchFamily="34" charset="0"/>
+              </a:rPr>
+              <a:t>For each interval, the population is updated at that frequency for 1 day.</a:t>
+            </a:r>
+          </a:p>
+          <a:p>
+            <a:pPr marL="0" marR="0" lvl="0" indent="0" algn="l" defTabSz="914400" rtl="0" eaLnBrk="0" fontAlgn="base" latinLnBrk="0" hangingPunct="0">
+              <a:lnSpc>
+                <a:spcPct val="100000"/>
+              </a:lnSpc>
+              <a:spcBef>
+                <a:spcPct val="0"/>
+              </a:spcBef>
+              <a:spcAft>
+                <a:spcPct val="0"/>
+              </a:spcAft>
+              <a:buClrTx/>
+              <a:buSzTx/>
+              <a:buFontTx/>
+              <a:buChar char="•"/>
+              <a:tabLst/>
+            </a:pPr>
+            <a:r>
+              <a:rPr kumimoji="0" lang="en-US" altLang="en-US" sz="1800" b="0" i="0" u="none" strike="noStrike" cap="none" normalizeH="0" baseline="0" dirty="0">
+                <a:ln>
+                  <a:noFill/>
+                </a:ln>
+                <a:solidFill>
+                  <a:schemeClr val="tx1"/>
+                </a:solidFill>
+                <a:effectLst/>
+                <a:latin typeface="Arial" panose="020B0604020202020204" pitchFamily="34" charset="0"/>
+              </a:rPr>
+              <a:t>A compound growth calculation is used at each fission step.</a:t>
+            </a:r>
+          </a:p>
+          <a:p>
+            <a:pPr marL="0" marR="0" lvl="0" indent="0" algn="l" defTabSz="914400" rtl="0" eaLnBrk="0" fontAlgn="base" latinLnBrk="0" hangingPunct="0">
+              <a:lnSpc>
+                <a:spcPct val="100000"/>
+              </a:lnSpc>
+              <a:spcBef>
+                <a:spcPct val="0"/>
+              </a:spcBef>
+              <a:spcAft>
+                <a:spcPct val="0"/>
+              </a:spcAft>
+              <a:buClrTx/>
+              <a:buSzTx/>
+              <a:buFontTx/>
+              <a:buChar char="•"/>
+              <a:tabLst/>
+            </a:pPr>
+            <a:r>
+              <a:rPr kumimoji="0" lang="en-US" altLang="en-US" sz="1800" b="0" i="0" u="none" strike="noStrike" cap="none" normalizeH="0" baseline="0" dirty="0">
+                <a:ln>
+                  <a:noFill/>
+                </a:ln>
+                <a:solidFill>
+                  <a:schemeClr val="tx1"/>
+                </a:solidFill>
+                <a:effectLst/>
+                <a:latin typeface="Arial" panose="020B0604020202020204" pitchFamily="34" charset="0"/>
+              </a:rPr>
+              <a:t>All results are stored and graphed using the module </a:t>
+            </a:r>
+            <a:r>
+              <a:rPr kumimoji="0" lang="en-US" altLang="en-US" sz="1800" b="0" i="0" u="none" strike="noStrike" cap="none" normalizeH="0" baseline="0" dirty="0">
+                <a:ln>
+                  <a:noFill/>
+                </a:ln>
+                <a:solidFill>
+                  <a:schemeClr val="accent6">
+                    <a:lumMod val="75000"/>
+                  </a:schemeClr>
+                </a:solidFill>
+                <a:effectLst/>
+                <a:latin typeface="Arial" panose="020B0604020202020204" pitchFamily="34" charset="0"/>
+              </a:rPr>
+              <a:t>Matplotlib</a:t>
+            </a:r>
+          </a:p>
+          <a:p>
+            <a:pPr marL="0" marR="0" lvl="0" indent="0" algn="l" defTabSz="914400" rtl="0" eaLnBrk="0" fontAlgn="base" latinLnBrk="0" hangingPunct="0">
+              <a:lnSpc>
+                <a:spcPct val="100000"/>
+              </a:lnSpc>
+              <a:spcBef>
+                <a:spcPct val="0"/>
+              </a:spcBef>
+              <a:spcAft>
+                <a:spcPct val="0"/>
+              </a:spcAft>
+              <a:buClrTx/>
+              <a:buSzTx/>
+              <a:buFontTx/>
+              <a:buChar char="•"/>
+              <a:tabLst/>
+            </a:pPr>
+            <a:r>
+              <a:rPr kumimoji="0" lang="en-US" altLang="en-US" sz="1800" b="0" i="0" u="none" strike="noStrike" cap="none" normalizeH="0" baseline="0" dirty="0">
+                <a:ln>
+                  <a:noFill/>
+                </a:ln>
+                <a:solidFill>
+                  <a:schemeClr val="tx1"/>
+                </a:solidFill>
+                <a:effectLst/>
+                <a:latin typeface="Arial" panose="020B0604020202020204" pitchFamily="34" charset="0"/>
+              </a:rPr>
+              <a:t>Graphs show clear trends.</a:t>
+            </a:r>
+          </a:p>
+          <a:p>
+            <a:pPr marL="0" marR="0" lvl="0" indent="0" algn="l" defTabSz="914400" rtl="0" eaLnBrk="0" fontAlgn="base" latinLnBrk="0" hangingPunct="0">
+              <a:lnSpc>
+                <a:spcPct val="100000"/>
+              </a:lnSpc>
+              <a:spcBef>
+                <a:spcPct val="0"/>
+              </a:spcBef>
+              <a:spcAft>
+                <a:spcPct val="0"/>
+              </a:spcAft>
+              <a:buClrTx/>
+              <a:buSzTx/>
+              <a:buFontTx/>
+              <a:buChar char="•"/>
+              <a:tabLst/>
+            </a:pPr>
+            <a:r>
+              <a:rPr kumimoji="0" lang="en-US" altLang="en-US" sz="1800" b="0" i="0" u="none" strike="noStrike" cap="none" normalizeH="0" baseline="0" dirty="0">
+                <a:ln>
+                  <a:noFill/>
+                </a:ln>
+                <a:solidFill>
+                  <a:schemeClr val="tx1"/>
+                </a:solidFill>
+                <a:effectLst/>
+                <a:latin typeface="Arial" panose="020B0604020202020204" pitchFamily="34" charset="0"/>
+              </a:rPr>
+              <a:t>For minute and second intervals, a zoomed-in inset shows how small the individual steps become.</a:t>
+            </a:r>
+          </a:p>
+          <a:p>
+            <a:pPr marL="0" marR="0" lvl="0" indent="0" algn="l" defTabSz="914400" rtl="0" eaLnBrk="0" fontAlgn="base" latinLnBrk="0" hangingPunct="0">
+              <a:lnSpc>
+                <a:spcPct val="100000"/>
+              </a:lnSpc>
+              <a:spcBef>
+                <a:spcPct val="0"/>
+              </a:spcBef>
+              <a:spcAft>
+                <a:spcPct val="0"/>
+              </a:spcAft>
+              <a:buClrTx/>
+              <a:buSzTx/>
+              <a:buFontTx/>
+              <a:buChar char="•"/>
+              <a:tabLst/>
+            </a:pPr>
+            <a:r>
+              <a:rPr kumimoji="0" lang="en-US" altLang="en-US" sz="1800" b="0" i="0" u="none" strike="noStrike" cap="none" normalizeH="0" baseline="0" dirty="0">
+                <a:ln>
+                  <a:noFill/>
+                </a:ln>
+                <a:solidFill>
+                  <a:schemeClr val="tx1"/>
+                </a:solidFill>
+                <a:effectLst/>
+                <a:latin typeface="Arial" panose="020B0604020202020204" pitchFamily="34" charset="0"/>
+              </a:rPr>
+              <a:t>The final population approaches a fixed limit due to continuous compounding.</a:t>
+            </a:r>
+          </a:p>
+          <a:p>
+            <a:pPr marL="0" marR="0" lvl="0" indent="0" algn="l" defTabSz="914400" rtl="0" eaLnBrk="0" fontAlgn="base" latinLnBrk="0" hangingPunct="0">
+              <a:lnSpc>
+                <a:spcPct val="100000"/>
+              </a:lnSpc>
+              <a:spcBef>
+                <a:spcPct val="0"/>
+              </a:spcBef>
+              <a:spcAft>
+                <a:spcPct val="0"/>
+              </a:spcAft>
+              <a:buClrTx/>
+              <a:buSzTx/>
+              <a:buFontTx/>
+              <a:buChar char="•"/>
+              <a:tabLst/>
+            </a:pPr>
+            <a:endParaRPr lang="en-US" altLang="en-US" dirty="0">
+              <a:latin typeface="Arial" panose="020B0604020202020204" pitchFamily="34" charset="0"/>
+            </a:endParaRPr>
+          </a:p>
+          <a:p>
+            <a:pPr marL="0" marR="0" lvl="0" indent="0" algn="l" defTabSz="914400" rtl="0" eaLnBrk="0" fontAlgn="base" latinLnBrk="0" hangingPunct="0">
+              <a:lnSpc>
+                <a:spcPct val="100000"/>
+              </a:lnSpc>
+              <a:spcBef>
+                <a:spcPct val="0"/>
+              </a:spcBef>
+              <a:spcAft>
+                <a:spcPct val="0"/>
+              </a:spcAft>
+              <a:buClrTx/>
+              <a:buSzTx/>
+              <a:buFontTx/>
+              <a:buChar char="•"/>
+              <a:tabLst/>
+            </a:pPr>
+            <a:r>
+              <a:rPr kumimoji="0" lang="en-US" altLang="en-US" sz="1800" b="0" i="0" u="none" strike="noStrike" cap="none" normalizeH="0" baseline="0" dirty="0">
+                <a:ln>
+                  <a:noFill/>
+                </a:ln>
+                <a:solidFill>
+                  <a:schemeClr val="tx1"/>
+                </a:solidFill>
+                <a:effectLst/>
+                <a:latin typeface="Arial" panose="020B0604020202020204" pitchFamily="34" charset="0"/>
+              </a:rPr>
+              <a:t>The only reason </a:t>
+            </a:r>
+            <a:r>
+              <a:rPr kumimoji="0" lang="en-US" altLang="en-US" sz="1800" b="0" i="0" u="none" strike="noStrike" cap="none" normalizeH="0" baseline="0" dirty="0" err="1">
+                <a:ln>
+                  <a:noFill/>
+                </a:ln>
+                <a:solidFill>
+                  <a:schemeClr val="tx1"/>
+                </a:solidFill>
+                <a:effectLst/>
+                <a:latin typeface="Arial" panose="020B0604020202020204" pitchFamily="34" charset="0"/>
+              </a:rPr>
+              <a:t>theres</a:t>
+            </a:r>
+            <a:r>
+              <a:rPr kumimoji="0" lang="en-US" altLang="en-US" sz="1800" b="0" i="0" u="none" strike="noStrike" cap="none" normalizeH="0" baseline="0" dirty="0">
+                <a:ln>
+                  <a:noFill/>
+                </a:ln>
+                <a:solidFill>
+                  <a:schemeClr val="tx1"/>
+                </a:solidFill>
+                <a:effectLst/>
+                <a:latin typeface="Arial" panose="020B0604020202020204" pitchFamily="34" charset="0"/>
+              </a:rPr>
+              <a:t> so many lines in this is because of the graph making</a:t>
+            </a:r>
+          </a:p>
+          <a:p>
+            <a:pPr marL="0" marR="0" lvl="0" indent="0" algn="l" defTabSz="914400" rtl="0" eaLnBrk="0" fontAlgn="base" latinLnBrk="0" hangingPunct="0">
+              <a:lnSpc>
+                <a:spcPct val="100000"/>
+              </a:lnSpc>
+              <a:spcBef>
+                <a:spcPct val="0"/>
+              </a:spcBef>
+              <a:spcAft>
+                <a:spcPct val="0"/>
+              </a:spcAft>
+              <a:buClrTx/>
+              <a:buSzTx/>
+              <a:buFontTx/>
+              <a:buNone/>
+              <a:tabLst/>
+            </a:pPr>
+            <a:endParaRPr kumimoji="0" lang="en-US" altLang="en-US" sz="1800" b="0" i="0" u="none" strike="noStrike" cap="none" normalizeH="0" baseline="0" dirty="0">
+              <a:ln>
+                <a:noFill/>
+              </a:ln>
+              <a:solidFill>
+                <a:schemeClr val="tx1"/>
+              </a:solidFill>
+              <a:effectLst/>
+              <a:latin typeface="Arial" panose="020B0604020202020204" pitchFamily="34" charset="0"/>
+            </a:endParaRPr>
+          </a:p>
+        </p:txBody>
+      </p:sp>
     </p:spTree>
   </p:cSld>
   <p:clrMapOvr>
@@ -3728,7 +4134,86 @@
           <a:lstStyle/>
           <a:p>
             <a:r>
-              <a:t>Population Growth Limit</a:t>
+              <a:rPr dirty="0"/>
+              <a:t>Graph: </a:t>
+            </a:r>
+            <a:r>
+              <a:rPr lang="en-US" dirty="0"/>
+              <a:t>Hourly </a:t>
+            </a:r>
+            <a:r>
+              <a:rPr dirty="0"/>
+              <a:t>Fission</a:t>
+            </a:r>
+          </a:p>
+        </p:txBody>
+      </p:sp>
+      <p:pic>
+        <p:nvPicPr>
+          <p:cNvPr id="4" name="Picture 3"/>
+          <p:cNvPicPr>
+            <a:picLocks noChangeAspect="1"/>
+          </p:cNvPicPr>
+          <p:nvPr/>
+        </p:nvPicPr>
+        <p:blipFill>
+          <a:blip r:embed="rId2"/>
+          <a:srcRect/>
+          <a:stretch/>
+        </p:blipFill>
+        <p:spPr>
+          <a:xfrm>
+            <a:off x="265813" y="1562986"/>
+            <a:ext cx="8420987" cy="4210492"/>
+          </a:xfrm>
+          <a:prstGeom prst="rect">
+            <a:avLst/>
+          </a:prstGeom>
+        </p:spPr>
+      </p:pic>
+    </p:spTree>
+  </p:cSld>
+  <p:clrMapOvr>
+    <a:masterClrMapping/>
+  </p:clrMapOvr>
+</p:sld>
+</file>
+
+<file path=ppt/slides/slide12.xml><?xml version="1.0" encoding="utf-8"?>
+<p:sld xmlns:a="http://schemas.openxmlformats.org/drawingml/2006/main" xmlns:r="http://schemas.openxmlformats.org/officeDocument/2006/relationships" xmlns:p="http://schemas.openxmlformats.org/presentationml/2006/main">
+  <p:cSld>
+    <p:spTree>
+      <p:nvGrpSpPr>
+        <p:cNvPr id="1" name=""/>
+        <p:cNvGrpSpPr/>
+        <p:nvPr/>
+      </p:nvGrpSpPr>
+      <p:grpSpPr>
+        <a:xfrm>
+          <a:off x="0" y="0"/>
+          <a:ext cx="0" cy="0"/>
+          <a:chOff x="0" y="0"/>
+          <a:chExt cx="0" cy="0"/>
+        </a:xfrm>
+      </p:grpSpPr>
+      <p:sp>
+        <p:nvSpPr>
+          <p:cNvPr id="2" name="Title 1"/>
+          <p:cNvSpPr>
+            <a:spLocks noGrp="1"/>
+          </p:cNvSpPr>
+          <p:nvPr>
+            <p:ph type="title"/>
+          </p:nvPr>
+        </p:nvSpPr>
+        <p:spPr/>
+        <p:txBody>
+          <a:bodyPr/>
+          <a:lstStyle/>
+          <a:p>
+            <a:r>
+              <a:rPr dirty="0"/>
+              <a:t>Graph: Second Fission</a:t>
             </a:r>
           </a:p>
         </p:txBody>
@@ -3750,6 +4235,114 @@
           <a:p>
             <a:r>
               <a:rPr dirty="0"/>
+              <a:t>Growth step</a:t>
+            </a:r>
+            <a:r>
+              <a:rPr lang="en-US" dirty="0"/>
+              <a:t> dots</a:t>
+            </a:r>
+            <a:r>
+              <a:rPr dirty="0"/>
+              <a:t> are almost invisible without </a:t>
+            </a:r>
+            <a:r>
+              <a:rPr lang="en-US" dirty="0"/>
+              <a:t>inset zoom in lower right</a:t>
+            </a:r>
+            <a:r>
+              <a:rPr dirty="0"/>
+              <a:t>.</a:t>
+            </a:r>
+          </a:p>
+        </p:txBody>
+      </p:sp>
+      <p:pic>
+        <p:nvPicPr>
+          <p:cNvPr id="4" name="Picture 3" descr="Monday_10-17_second.png"/>
+          <p:cNvPicPr>
+            <a:picLocks noChangeAspect="1"/>
+          </p:cNvPicPr>
+          <p:nvPr/>
+        </p:nvPicPr>
+        <p:blipFill>
+          <a:blip r:embed="rId2"/>
+          <a:stretch>
+            <a:fillRect/>
+          </a:stretch>
+        </p:blipFill>
+        <p:spPr>
+          <a:xfrm>
+            <a:off x="574157" y="2649316"/>
+            <a:ext cx="7995685" cy="3997843"/>
+          </a:xfrm>
+          <a:prstGeom prst="rect">
+            <a:avLst/>
+          </a:prstGeom>
+        </p:spPr>
+      </p:pic>
+    </p:spTree>
+  </p:cSld>
+  <p:clrMapOvr>
+    <a:masterClrMapping/>
+  </p:clrMapOvr>
+</p:sld>
+</file>
+
+<file path=ppt/slides/slide13.xml><?xml version="1.0" encoding="utf-8"?>
+<p:sld xmlns:a="http://schemas.openxmlformats.org/drawingml/2006/main" xmlns:r="http://schemas.openxmlformats.org/officeDocument/2006/relationships" xmlns:p="http://schemas.openxmlformats.org/presentationml/2006/main">
+  <p:cSld>
+    <p:spTree>
+      <p:nvGrpSpPr>
+        <p:cNvPr id="1" name=""/>
+        <p:cNvGrpSpPr/>
+        <p:nvPr/>
+      </p:nvGrpSpPr>
+      <p:grpSpPr>
+        <a:xfrm>
+          <a:off x="0" y="0"/>
+          <a:ext cx="0" cy="0"/>
+          <a:chOff x="0" y="0"/>
+          <a:chExt cx="0" cy="0"/>
+        </a:xfrm>
+      </p:grpSpPr>
+      <p:sp>
+        <p:nvSpPr>
+          <p:cNvPr id="2" name="Title 1"/>
+          <p:cNvSpPr>
+            <a:spLocks noGrp="1"/>
+          </p:cNvSpPr>
+          <p:nvPr>
+            <p:ph type="title"/>
+          </p:nvPr>
+        </p:nvSpPr>
+        <p:spPr/>
+        <p:txBody>
+          <a:bodyPr/>
+          <a:lstStyle/>
+          <a:p>
+            <a:r>
+              <a:t>Population Growth Limit</a:t>
+            </a:r>
+          </a:p>
+        </p:txBody>
+      </p:sp>
+      <p:sp>
+        <p:nvSpPr>
+          <p:cNvPr id="3" name="Content Placeholder 2"/>
+          <p:cNvSpPr>
+            <a:spLocks noGrp="1"/>
+          </p:cNvSpPr>
+          <p:nvPr>
+            <p:ph idx="1"/>
+          </p:nvPr>
+        </p:nvSpPr>
+        <p:spPr/>
+        <p:txBody>
+          <a:bodyPr/>
+          <a:lstStyle/>
+          <a:p>
+            <a:r>
+              <a:rPr dirty="0"/>
               <a:t>As frequency increases, population size approaches a fixed limit, not infinity. This matches continuous growth using Euler's number ≈ 2.718.</a:t>
             </a:r>
           </a:p>
@@ -3763,7 +4356,7 @@
 </p:sld>
 </file>
 
-<file path=ppt/slides/slide12.xml><?xml version="1.0" encoding="utf-8"?>
+<file path=ppt/slides/slide14.xml><?xml version="1.0" encoding="utf-8"?>
 <p:sld xmlns:a="http://schemas.openxmlformats.org/drawingml/2006/main" xmlns:r="http://schemas.openxmlformats.org/officeDocument/2006/relationships" xmlns:p="http://schemas.openxmlformats.org/presentationml/2006/main">
   <p:cSld>
     <p:bg>
@@ -4099,7 +4692,7 @@
 </p:sld>
 </file>
 
-<file path=ppt/slides/slide13.xml><?xml version="1.0" encoding="utf-8"?>
+<file path=ppt/slides/slide15.xml><?xml version="1.0" encoding="utf-8"?>
 <p:sld xmlns:a="http://schemas.openxmlformats.org/drawingml/2006/main" xmlns:r="http://schemas.openxmlformats.org/officeDocument/2006/relationships" xmlns:p="http://schemas.openxmlformats.org/presentationml/2006/main">
   <p:cSld>
     <p:bg>
@@ -4435,7 +5028,7 @@
 </p:sld>
 </file>
 
-<file path=ppt/slides/slide14.xml><?xml version="1.0" encoding="utf-8"?>
+<file path=ppt/slides/slide2.xml><?xml version="1.0" encoding="utf-8"?>
 <p:sld xmlns:a="http://schemas.openxmlformats.org/drawingml/2006/main" xmlns:r="http://schemas.openxmlformats.org/officeDocument/2006/relationships" xmlns:p="http://schemas.openxmlformats.org/presentationml/2006/main">
   <p:cSld>
     <p:bg>
@@ -4667,8 +5260,8 @@
         </p:nvSpPr>
         <p:spPr>
           <a:xfrm>
-            <a:off x="806825" y="1188637"/>
-            <a:ext cx="2241175" cy="4480726"/>
+            <a:off x="481331" y="1188637"/>
+            <a:ext cx="2566670" cy="4480726"/>
           </a:xfrm>
         </p:spPr>
         <p:txBody>
@@ -4680,9 +5273,9 @@
             <a:pPr algn="r"/>
             <a:r>
               <a:rPr lang="en-US" dirty="0"/>
-              <a:t>All modules used</a:t>
-            </a:r>
-            <a:endParaRPr lang="en-AU"/>
+              <a:t>1.1 document used modules</a:t>
+            </a:r>
+            <a:endParaRPr lang="en-AU" dirty="0"/>
           </a:p>
         </p:txBody>
       </p:sp>
@@ -4850,7 +5443,7 @@
 </p:sld>
 </file>
 
-<file path=ppt/slides/slide2.xml><?xml version="1.0" encoding="utf-8"?>
+<file path=ppt/slides/slide3.xml><?xml version="1.0" encoding="utf-8"?>
 <p:sld xmlns:a="http://schemas.openxmlformats.org/drawingml/2006/main" xmlns:r="http://schemas.openxmlformats.org/officeDocument/2006/relationships" xmlns:p="http://schemas.openxmlformats.org/presentationml/2006/main">
   <p:cSld>
     <p:spTree>
@@ -4869,10 +5462,10 @@
       </p:grpSpPr>
       <p:sp>
         <p:nvSpPr>
-          <p:cNvPr id="3" name="Content Placeholder 2">
+          <p:cNvPr id="2" name="Title 1">
             <a:extLst>
               <a:ext uri="{FF2B5EF4-FFF2-40B4-BE49-F238E27FC236}">
-                <a16:creationId xmlns:a16="http://schemas.microsoft.com/office/drawing/2014/main" id="{A6559B53-EEA0-AD4B-E407-F08ECAAD8A49}"/>
+                <a16:creationId xmlns:a16="http://schemas.microsoft.com/office/drawing/2014/main" id="{B4238AF1-419F-7429-F1A4-3D9EBD7E05BE}"/>
               </a:ext>
             </a:extLst>
           </p:cNvPr>
@@ -4880,26 +5473,1363 @@
             <a:spLocks noGrp="1"/>
           </p:cNvSpPr>
           <p:nvPr>
-            <p:ph idx="1"/>
+            <p:ph type="title"/>
           </p:nvPr>
         </p:nvSpPr>
         <p:spPr/>
         <p:txBody>
-          <a:bodyPr/>
+          <a:bodyPr>
+            <a:normAutofit fontScale="90000"/>
+          </a:bodyPr>
           <a:lstStyle/>
           <a:p>
             <a:r>
               <a:rPr lang="en-US" dirty="0"/>
-              <a:t>Ignore the fact that the code is 600 lines, that only happened because I decided to make my code PEP 8 compliant. PEP 8 is the formatting guidelines that python developers usually use. It gives the code easier readability for the user.</a:t>
+              <a:t>1.2 Reusable means of converting time periods</a:t>
             </a:r>
             <a:endParaRPr lang="en-AU" dirty="0"/>
+          </a:p>
+        </p:txBody>
+      </p:sp>
+      <p:sp>
+        <p:nvSpPr>
+          <p:cNvPr id="4" name="Rectangle 3">
+            <a:extLst>
+              <a:ext uri="{FF2B5EF4-FFF2-40B4-BE49-F238E27FC236}">
+                <a16:creationId xmlns:a16="http://schemas.microsoft.com/office/drawing/2014/main" id="{1762149D-2D21-14C9-9880-AF1C9DBE9ECF}"/>
+              </a:ext>
+            </a:extLst>
+          </p:cNvPr>
+          <p:cNvSpPr/>
+          <p:nvPr/>
+        </p:nvSpPr>
+        <p:spPr>
+          <a:xfrm>
+            <a:off x="537210" y="2954470"/>
+            <a:ext cx="8069580" cy="3421557"/>
+          </a:xfrm>
+          <a:prstGeom prst="rect">
+            <a:avLst/>
+          </a:prstGeom>
+          <a:solidFill>
+            <a:srgbClr val="1E1E1E"/>
+          </a:solidFill>
+          <a:ln>
+            <a:solidFill>
+              <a:srgbClr val="505050"/>
+            </a:solidFill>
+          </a:ln>
+        </p:spPr>
+        <p:style>
+          <a:lnRef idx="1">
+            <a:schemeClr val="accent1"/>
+          </a:lnRef>
+          <a:fillRef idx="3">
+            <a:schemeClr val="accent1"/>
+          </a:fillRef>
+          <a:effectRef idx="2">
+            <a:schemeClr val="accent1"/>
+          </a:effectRef>
+          <a:fontRef idx="minor">
+            <a:schemeClr val="lt1"/>
+          </a:fontRef>
+        </p:style>
+        <p:txBody>
+          <a:bodyPr wrap="square" lIns="137160" tIns="91440" rtlCol="0" anchor="ctr"/>
+          <a:lstStyle/>
+          <a:p>
+            <a:pPr>
+              <a:lnSpc>
+                <a:spcPts val="1425"/>
+              </a:lnSpc>
+              <a:buNone/>
+            </a:pPr>
+            <a:r>
+              <a:rPr lang="en-US" sz="1000" b="0" i="1" dirty="0">
+                <a:solidFill>
+                  <a:srgbClr val="5AD4E6"/>
+                </a:solidFill>
+                <a:effectLst/>
+                <a:latin typeface="Consolas" panose="020B0609020204030204" pitchFamily="49" charset="0"/>
+              </a:rPr>
+              <a:t>def</a:t>
+            </a:r>
+            <a:r>
+              <a:rPr lang="en-US" sz="1000" b="0" dirty="0">
+                <a:solidFill>
+                  <a:srgbClr val="F7F1FF"/>
+                </a:solidFill>
+                <a:effectLst/>
+                <a:latin typeface="Consolas" panose="020B0609020204030204" pitchFamily="49" charset="0"/>
+              </a:rPr>
+              <a:t> </a:t>
+            </a:r>
+            <a:r>
+              <a:rPr lang="en-US" sz="1000" b="0" dirty="0" err="1">
+                <a:solidFill>
+                  <a:srgbClr val="7BD88F"/>
+                </a:solidFill>
+                <a:effectLst/>
+                <a:latin typeface="Consolas" panose="020B0609020204030204" pitchFamily="49" charset="0"/>
+              </a:rPr>
+              <a:t>time_conversion</a:t>
+            </a:r>
+            <a:r>
+              <a:rPr lang="en-US" sz="1000" b="0" dirty="0">
+                <a:solidFill>
+                  <a:srgbClr val="8B888F"/>
+                </a:solidFill>
+                <a:effectLst/>
+                <a:latin typeface="Consolas" panose="020B0609020204030204" pitchFamily="49" charset="0"/>
+              </a:rPr>
+              <a:t>(</a:t>
+            </a:r>
+            <a:r>
+              <a:rPr lang="en-US" sz="1000" b="0" i="1" dirty="0">
+                <a:solidFill>
+                  <a:srgbClr val="FD9353"/>
+                </a:solidFill>
+                <a:effectLst/>
+                <a:latin typeface="Consolas" panose="020B0609020204030204" pitchFamily="49" charset="0"/>
+              </a:rPr>
+              <a:t>unit</a:t>
+            </a:r>
+            <a:r>
+              <a:rPr lang="en-US" sz="1000" b="0" dirty="0">
+                <a:solidFill>
+                  <a:srgbClr val="8B888F"/>
+                </a:solidFill>
+                <a:effectLst/>
+                <a:latin typeface="Consolas" panose="020B0609020204030204" pitchFamily="49" charset="0"/>
+              </a:rPr>
+              <a:t>,</a:t>
+            </a:r>
+            <a:r>
+              <a:rPr lang="en-US" sz="1000" b="0" dirty="0">
+                <a:solidFill>
+                  <a:srgbClr val="F7F1FF"/>
+                </a:solidFill>
+                <a:effectLst/>
+                <a:latin typeface="Consolas" panose="020B0609020204030204" pitchFamily="49" charset="0"/>
+              </a:rPr>
+              <a:t> </a:t>
+            </a:r>
+            <a:r>
+              <a:rPr lang="en-US" sz="1000" b="0" i="1" dirty="0">
+                <a:solidFill>
+                  <a:srgbClr val="FD9353"/>
+                </a:solidFill>
+                <a:effectLst/>
+                <a:latin typeface="Consolas" panose="020B0609020204030204" pitchFamily="49" charset="0"/>
+              </a:rPr>
+              <a:t>amount</a:t>
+            </a:r>
+            <a:r>
+              <a:rPr lang="en-US" sz="1000" b="0" dirty="0">
+                <a:solidFill>
+                  <a:srgbClr val="8B888F"/>
+                </a:solidFill>
+                <a:effectLst/>
+                <a:latin typeface="Consolas" panose="020B0609020204030204" pitchFamily="49" charset="0"/>
+              </a:rPr>
+              <a:t>):</a:t>
+            </a:r>
+            <a:endParaRPr lang="en-US" sz="1000" b="0" dirty="0">
+              <a:solidFill>
+                <a:srgbClr val="F7F1FF"/>
+              </a:solidFill>
+              <a:effectLst/>
+              <a:latin typeface="Consolas" panose="020B0609020204030204" pitchFamily="49" charset="0"/>
+            </a:endParaRPr>
+          </a:p>
+          <a:p>
+            <a:pPr>
+              <a:lnSpc>
+                <a:spcPts val="1425"/>
+              </a:lnSpc>
+              <a:buNone/>
+            </a:pPr>
+            <a:r>
+              <a:rPr lang="en-US" sz="1000" b="0" dirty="0">
+                <a:solidFill>
+                  <a:srgbClr val="F7F1FF"/>
+                </a:solidFill>
+                <a:effectLst/>
+                <a:latin typeface="Consolas" panose="020B0609020204030204" pitchFamily="49" charset="0"/>
+              </a:rPr>
+              <a:t>    </a:t>
+            </a:r>
+            <a:r>
+              <a:rPr lang="en-US" sz="1000" b="0" dirty="0">
+                <a:solidFill>
+                  <a:srgbClr val="69676C"/>
+                </a:solidFill>
+                <a:effectLst/>
+                <a:latin typeface="Consolas" panose="020B0609020204030204" pitchFamily="49" charset="0"/>
+              </a:rPr>
+              <a:t>'''</a:t>
+            </a:r>
+            <a:endParaRPr lang="en-US" sz="1000" b="0" dirty="0">
+              <a:solidFill>
+                <a:srgbClr val="F7F1FF"/>
+              </a:solidFill>
+              <a:effectLst/>
+              <a:latin typeface="Consolas" panose="020B0609020204030204" pitchFamily="49" charset="0"/>
+            </a:endParaRPr>
+          </a:p>
+          <a:p>
+            <a:pPr>
+              <a:lnSpc>
+                <a:spcPts val="1425"/>
+              </a:lnSpc>
+              <a:buNone/>
+            </a:pPr>
+            <a:r>
+              <a:rPr lang="en-US" sz="1000" b="0" dirty="0">
+                <a:solidFill>
+                  <a:srgbClr val="69676C"/>
+                </a:solidFill>
+                <a:effectLst/>
+                <a:latin typeface="Consolas" panose="020B0609020204030204" pitchFamily="49" charset="0"/>
+              </a:rPr>
+              <a:t>    Converts a time quantity from a unit to seconds.</a:t>
+            </a:r>
+            <a:endParaRPr lang="en-US" sz="1000" b="0" dirty="0">
+              <a:solidFill>
+                <a:srgbClr val="F7F1FF"/>
+              </a:solidFill>
+              <a:effectLst/>
+              <a:latin typeface="Consolas" panose="020B0609020204030204" pitchFamily="49" charset="0"/>
+            </a:endParaRPr>
+          </a:p>
+          <a:p>
+            <a:pPr>
+              <a:lnSpc>
+                <a:spcPts val="1425"/>
+              </a:lnSpc>
+              <a:buNone/>
+            </a:pPr>
+            <a:r>
+              <a:rPr lang="en-US" sz="1000" b="0" dirty="0">
+                <a:solidFill>
+                  <a:srgbClr val="69676C"/>
+                </a:solidFill>
+                <a:effectLst/>
+                <a:latin typeface="Consolas" panose="020B0609020204030204" pitchFamily="49" charset="0"/>
+              </a:rPr>
+              <a:t>    It takes the unit and the number of those units as arguments and returns the equivalent number of seconds.</a:t>
+            </a:r>
+            <a:endParaRPr lang="en-US" sz="1000" b="0" dirty="0">
+              <a:solidFill>
+                <a:srgbClr val="F7F1FF"/>
+              </a:solidFill>
+              <a:effectLst/>
+              <a:latin typeface="Consolas" panose="020B0609020204030204" pitchFamily="49" charset="0"/>
+            </a:endParaRPr>
+          </a:p>
+          <a:p>
+            <a:pPr>
+              <a:lnSpc>
+                <a:spcPts val="1425"/>
+              </a:lnSpc>
+              <a:buNone/>
+            </a:pPr>
+            <a:r>
+              <a:rPr lang="en-US" sz="1000" b="0" dirty="0">
+                <a:solidFill>
+                  <a:srgbClr val="69676C"/>
+                </a:solidFill>
+                <a:effectLst/>
+                <a:latin typeface="Consolas" panose="020B0609020204030204" pitchFamily="49" charset="0"/>
+              </a:rPr>
+              <a:t>    '''</a:t>
+            </a:r>
+            <a:endParaRPr lang="en-US" sz="1000" b="0" dirty="0">
+              <a:solidFill>
+                <a:srgbClr val="F7F1FF"/>
+              </a:solidFill>
+              <a:effectLst/>
+              <a:latin typeface="Consolas" panose="020B0609020204030204" pitchFamily="49" charset="0"/>
+            </a:endParaRPr>
+          </a:p>
+          <a:p>
+            <a:pPr>
+              <a:lnSpc>
+                <a:spcPts val="1425"/>
+              </a:lnSpc>
+              <a:buNone/>
+            </a:pPr>
+            <a:r>
+              <a:rPr lang="en-US" sz="1000" b="0" dirty="0">
+                <a:solidFill>
+                  <a:srgbClr val="F7F1FF"/>
+                </a:solidFill>
+                <a:effectLst/>
+                <a:latin typeface="Consolas" panose="020B0609020204030204" pitchFamily="49" charset="0"/>
+              </a:rPr>
+              <a:t>    </a:t>
+            </a:r>
+            <a:r>
+              <a:rPr lang="en-US" sz="1000" b="0" dirty="0" err="1">
+                <a:solidFill>
+                  <a:srgbClr val="F7F1FF"/>
+                </a:solidFill>
+                <a:effectLst/>
+                <a:latin typeface="Consolas" panose="020B0609020204030204" pitchFamily="49" charset="0"/>
+              </a:rPr>
+              <a:t>seconds_per_unit</a:t>
+            </a:r>
+            <a:r>
+              <a:rPr lang="en-US" sz="1000" b="0" dirty="0">
+                <a:solidFill>
+                  <a:srgbClr val="F7F1FF"/>
+                </a:solidFill>
+                <a:effectLst/>
+                <a:latin typeface="Consolas" panose="020B0609020204030204" pitchFamily="49" charset="0"/>
+              </a:rPr>
+              <a:t> </a:t>
+            </a:r>
+            <a:r>
+              <a:rPr lang="en-US" sz="1000" b="0" dirty="0">
+                <a:solidFill>
+                  <a:srgbClr val="FC618D"/>
+                </a:solidFill>
+                <a:effectLst/>
+                <a:latin typeface="Consolas" panose="020B0609020204030204" pitchFamily="49" charset="0"/>
+              </a:rPr>
+              <a:t>=</a:t>
+            </a:r>
+            <a:r>
+              <a:rPr lang="en-US" sz="1000" b="0" dirty="0">
+                <a:solidFill>
+                  <a:srgbClr val="F7F1FF"/>
+                </a:solidFill>
+                <a:effectLst/>
+                <a:latin typeface="Consolas" panose="020B0609020204030204" pitchFamily="49" charset="0"/>
+              </a:rPr>
+              <a:t> </a:t>
+            </a:r>
+            <a:r>
+              <a:rPr lang="en-US" sz="1000" b="0" dirty="0">
+                <a:solidFill>
+                  <a:srgbClr val="8B888F"/>
+                </a:solidFill>
+                <a:effectLst/>
+                <a:latin typeface="Consolas" panose="020B0609020204030204" pitchFamily="49" charset="0"/>
+              </a:rPr>
+              <a:t>{</a:t>
+            </a:r>
+            <a:endParaRPr lang="en-US" sz="1000" b="0" dirty="0">
+              <a:solidFill>
+                <a:srgbClr val="F7F1FF"/>
+              </a:solidFill>
+              <a:effectLst/>
+              <a:latin typeface="Consolas" panose="020B0609020204030204" pitchFamily="49" charset="0"/>
+            </a:endParaRPr>
+          </a:p>
+          <a:p>
+            <a:pPr>
+              <a:lnSpc>
+                <a:spcPts val="1425"/>
+              </a:lnSpc>
+              <a:buNone/>
+            </a:pPr>
+            <a:r>
+              <a:rPr lang="en-US" sz="1000" b="0" dirty="0">
+                <a:solidFill>
+                  <a:srgbClr val="F7F1FF"/>
+                </a:solidFill>
+                <a:effectLst/>
+                <a:latin typeface="Consolas" panose="020B0609020204030204" pitchFamily="49" charset="0"/>
+              </a:rPr>
+              <a:t>        </a:t>
+            </a:r>
+            <a:r>
+              <a:rPr lang="en-US" sz="1000" b="0" dirty="0">
+                <a:solidFill>
+                  <a:srgbClr val="8B888F"/>
+                </a:solidFill>
+                <a:effectLst/>
+                <a:latin typeface="Consolas" panose="020B0609020204030204" pitchFamily="49" charset="0"/>
+              </a:rPr>
+              <a:t>"</a:t>
+            </a:r>
+            <a:r>
+              <a:rPr lang="en-US" sz="1000" b="0" dirty="0">
+                <a:solidFill>
+                  <a:srgbClr val="FCE566"/>
+                </a:solidFill>
+                <a:effectLst/>
+                <a:latin typeface="Consolas" panose="020B0609020204030204" pitchFamily="49" charset="0"/>
+              </a:rPr>
+              <a:t>year</a:t>
+            </a:r>
+            <a:r>
+              <a:rPr lang="en-US" sz="1000" b="0" dirty="0">
+                <a:solidFill>
+                  <a:srgbClr val="8B888F"/>
+                </a:solidFill>
+                <a:effectLst/>
+                <a:latin typeface="Consolas" panose="020B0609020204030204" pitchFamily="49" charset="0"/>
+              </a:rPr>
+              <a:t>":</a:t>
+            </a:r>
+            <a:r>
+              <a:rPr lang="en-US" sz="1000" b="0" dirty="0">
+                <a:solidFill>
+                  <a:srgbClr val="F7F1FF"/>
+                </a:solidFill>
+                <a:effectLst/>
+                <a:latin typeface="Consolas" panose="020B0609020204030204" pitchFamily="49" charset="0"/>
+              </a:rPr>
+              <a:t> </a:t>
+            </a:r>
+            <a:r>
+              <a:rPr lang="en-US" sz="1000" b="0" dirty="0">
+                <a:solidFill>
+                  <a:srgbClr val="948AE3"/>
+                </a:solidFill>
+                <a:effectLst/>
+                <a:latin typeface="Consolas" panose="020B0609020204030204" pitchFamily="49" charset="0"/>
+              </a:rPr>
+              <a:t>31536000</a:t>
+            </a:r>
+            <a:r>
+              <a:rPr lang="en-US" sz="1000" b="0" dirty="0">
+                <a:solidFill>
+                  <a:srgbClr val="8B888F"/>
+                </a:solidFill>
+                <a:effectLst/>
+                <a:latin typeface="Consolas" panose="020B0609020204030204" pitchFamily="49" charset="0"/>
+              </a:rPr>
+              <a:t>,</a:t>
+            </a:r>
+            <a:endParaRPr lang="en-US" sz="1000" b="0" dirty="0">
+              <a:solidFill>
+                <a:srgbClr val="F7F1FF"/>
+              </a:solidFill>
+              <a:effectLst/>
+              <a:latin typeface="Consolas" panose="020B0609020204030204" pitchFamily="49" charset="0"/>
+            </a:endParaRPr>
+          </a:p>
+          <a:p>
+            <a:pPr>
+              <a:lnSpc>
+                <a:spcPts val="1425"/>
+              </a:lnSpc>
+              <a:buNone/>
+            </a:pPr>
+            <a:r>
+              <a:rPr lang="en-US" sz="1000" b="0" dirty="0">
+                <a:solidFill>
+                  <a:srgbClr val="F7F1FF"/>
+                </a:solidFill>
+                <a:effectLst/>
+                <a:latin typeface="Consolas" panose="020B0609020204030204" pitchFamily="49" charset="0"/>
+              </a:rPr>
+              <a:t>        </a:t>
+            </a:r>
+            <a:r>
+              <a:rPr lang="en-US" sz="1000" b="0" dirty="0">
+                <a:solidFill>
+                  <a:srgbClr val="8B888F"/>
+                </a:solidFill>
+                <a:effectLst/>
+                <a:latin typeface="Consolas" panose="020B0609020204030204" pitchFamily="49" charset="0"/>
+              </a:rPr>
+              <a:t>"</a:t>
+            </a:r>
+            <a:r>
+              <a:rPr lang="en-US" sz="1000" b="0" dirty="0">
+                <a:solidFill>
+                  <a:srgbClr val="FCE566"/>
+                </a:solidFill>
+                <a:effectLst/>
+                <a:latin typeface="Consolas" panose="020B0609020204030204" pitchFamily="49" charset="0"/>
+              </a:rPr>
+              <a:t>quarter-year</a:t>
+            </a:r>
+            <a:r>
+              <a:rPr lang="en-US" sz="1000" b="0" dirty="0">
+                <a:solidFill>
+                  <a:srgbClr val="8B888F"/>
+                </a:solidFill>
+                <a:effectLst/>
+                <a:latin typeface="Consolas" panose="020B0609020204030204" pitchFamily="49" charset="0"/>
+              </a:rPr>
+              <a:t>":</a:t>
+            </a:r>
+            <a:r>
+              <a:rPr lang="en-US" sz="1000" b="0" dirty="0">
+                <a:solidFill>
+                  <a:srgbClr val="F7F1FF"/>
+                </a:solidFill>
+                <a:effectLst/>
+                <a:latin typeface="Consolas" panose="020B0609020204030204" pitchFamily="49" charset="0"/>
+              </a:rPr>
+              <a:t> </a:t>
+            </a:r>
+            <a:r>
+              <a:rPr lang="en-US" sz="1000" b="0" dirty="0">
+                <a:solidFill>
+                  <a:srgbClr val="948AE3"/>
+                </a:solidFill>
+                <a:effectLst/>
+                <a:latin typeface="Consolas" panose="020B0609020204030204" pitchFamily="49" charset="0"/>
+              </a:rPr>
+              <a:t>7884000</a:t>
+            </a:r>
+            <a:r>
+              <a:rPr lang="en-US" sz="1000" b="0" dirty="0">
+                <a:solidFill>
+                  <a:srgbClr val="8B888F"/>
+                </a:solidFill>
+                <a:effectLst/>
+                <a:latin typeface="Consolas" panose="020B0609020204030204" pitchFamily="49" charset="0"/>
+              </a:rPr>
+              <a:t>,</a:t>
+            </a:r>
+            <a:endParaRPr lang="en-US" sz="1000" b="0" dirty="0">
+              <a:solidFill>
+                <a:srgbClr val="F7F1FF"/>
+              </a:solidFill>
+              <a:effectLst/>
+              <a:latin typeface="Consolas" panose="020B0609020204030204" pitchFamily="49" charset="0"/>
+            </a:endParaRPr>
+          </a:p>
+          <a:p>
+            <a:pPr>
+              <a:lnSpc>
+                <a:spcPts val="1425"/>
+              </a:lnSpc>
+              <a:buNone/>
+            </a:pPr>
+            <a:r>
+              <a:rPr lang="en-US" sz="1000" b="0" dirty="0">
+                <a:solidFill>
+                  <a:srgbClr val="F7F1FF"/>
+                </a:solidFill>
+                <a:effectLst/>
+                <a:latin typeface="Consolas" panose="020B0609020204030204" pitchFamily="49" charset="0"/>
+              </a:rPr>
+              <a:t>        </a:t>
+            </a:r>
+            <a:r>
+              <a:rPr lang="en-US" sz="1000" b="0" dirty="0">
+                <a:solidFill>
+                  <a:srgbClr val="8B888F"/>
+                </a:solidFill>
+                <a:effectLst/>
+                <a:latin typeface="Consolas" panose="020B0609020204030204" pitchFamily="49" charset="0"/>
+              </a:rPr>
+              <a:t>"</a:t>
+            </a:r>
+            <a:r>
+              <a:rPr lang="en-US" sz="1000" b="0" dirty="0">
+                <a:solidFill>
+                  <a:srgbClr val="FCE566"/>
+                </a:solidFill>
+                <a:effectLst/>
+                <a:latin typeface="Consolas" panose="020B0609020204030204" pitchFamily="49" charset="0"/>
+              </a:rPr>
+              <a:t>month</a:t>
+            </a:r>
+            <a:r>
+              <a:rPr lang="en-US" sz="1000" b="0" dirty="0">
+                <a:solidFill>
+                  <a:srgbClr val="8B888F"/>
+                </a:solidFill>
+                <a:effectLst/>
+                <a:latin typeface="Consolas" panose="020B0609020204030204" pitchFamily="49" charset="0"/>
+              </a:rPr>
+              <a:t>":</a:t>
+            </a:r>
+            <a:r>
+              <a:rPr lang="en-US" sz="1000" b="0" dirty="0">
+                <a:solidFill>
+                  <a:srgbClr val="F7F1FF"/>
+                </a:solidFill>
+                <a:effectLst/>
+                <a:latin typeface="Consolas" panose="020B0609020204030204" pitchFamily="49" charset="0"/>
+              </a:rPr>
+              <a:t> </a:t>
+            </a:r>
+            <a:r>
+              <a:rPr lang="en-US" sz="1000" b="0" dirty="0">
+                <a:solidFill>
+                  <a:srgbClr val="948AE3"/>
+                </a:solidFill>
+                <a:effectLst/>
+                <a:latin typeface="Consolas" panose="020B0609020204030204" pitchFamily="49" charset="0"/>
+              </a:rPr>
+              <a:t>2592000</a:t>
+            </a:r>
+            <a:r>
+              <a:rPr lang="en-US" sz="1000" b="0" dirty="0">
+                <a:solidFill>
+                  <a:srgbClr val="8B888F"/>
+                </a:solidFill>
+                <a:effectLst/>
+                <a:latin typeface="Consolas" panose="020B0609020204030204" pitchFamily="49" charset="0"/>
+              </a:rPr>
+              <a:t>,</a:t>
+            </a:r>
+            <a:endParaRPr lang="en-US" sz="1000" b="0" dirty="0">
+              <a:solidFill>
+                <a:srgbClr val="F7F1FF"/>
+              </a:solidFill>
+              <a:effectLst/>
+              <a:latin typeface="Consolas" panose="020B0609020204030204" pitchFamily="49" charset="0"/>
+            </a:endParaRPr>
+          </a:p>
+          <a:p>
+            <a:pPr>
+              <a:lnSpc>
+                <a:spcPts val="1425"/>
+              </a:lnSpc>
+              <a:buNone/>
+            </a:pPr>
+            <a:r>
+              <a:rPr lang="en-US" sz="1000" b="0" dirty="0">
+                <a:solidFill>
+                  <a:srgbClr val="F7F1FF"/>
+                </a:solidFill>
+                <a:effectLst/>
+                <a:latin typeface="Consolas" panose="020B0609020204030204" pitchFamily="49" charset="0"/>
+              </a:rPr>
+              <a:t>        </a:t>
+            </a:r>
+            <a:r>
+              <a:rPr lang="en-US" sz="1000" b="0" dirty="0">
+                <a:solidFill>
+                  <a:srgbClr val="8B888F"/>
+                </a:solidFill>
+                <a:effectLst/>
+                <a:latin typeface="Consolas" panose="020B0609020204030204" pitchFamily="49" charset="0"/>
+              </a:rPr>
+              <a:t>"</a:t>
+            </a:r>
+            <a:r>
+              <a:rPr lang="en-US" sz="1000" b="0" dirty="0">
+                <a:solidFill>
+                  <a:srgbClr val="FCE566"/>
+                </a:solidFill>
+                <a:effectLst/>
+                <a:latin typeface="Consolas" panose="020B0609020204030204" pitchFamily="49" charset="0"/>
+              </a:rPr>
+              <a:t>week</a:t>
+            </a:r>
+            <a:r>
+              <a:rPr lang="en-US" sz="1000" b="0" dirty="0">
+                <a:solidFill>
+                  <a:srgbClr val="8B888F"/>
+                </a:solidFill>
+                <a:effectLst/>
+                <a:latin typeface="Consolas" panose="020B0609020204030204" pitchFamily="49" charset="0"/>
+              </a:rPr>
+              <a:t>":</a:t>
+            </a:r>
+            <a:r>
+              <a:rPr lang="en-US" sz="1000" b="0" dirty="0">
+                <a:solidFill>
+                  <a:srgbClr val="F7F1FF"/>
+                </a:solidFill>
+                <a:effectLst/>
+                <a:latin typeface="Consolas" panose="020B0609020204030204" pitchFamily="49" charset="0"/>
+              </a:rPr>
+              <a:t> </a:t>
+            </a:r>
+            <a:r>
+              <a:rPr lang="en-US" sz="1000" b="0" dirty="0">
+                <a:solidFill>
+                  <a:srgbClr val="948AE3"/>
+                </a:solidFill>
+                <a:effectLst/>
+                <a:latin typeface="Consolas" panose="020B0609020204030204" pitchFamily="49" charset="0"/>
+              </a:rPr>
+              <a:t>604800</a:t>
+            </a:r>
+            <a:r>
+              <a:rPr lang="en-US" sz="1000" b="0" dirty="0">
+                <a:solidFill>
+                  <a:srgbClr val="8B888F"/>
+                </a:solidFill>
+                <a:effectLst/>
+                <a:latin typeface="Consolas" panose="020B0609020204030204" pitchFamily="49" charset="0"/>
+              </a:rPr>
+              <a:t>,</a:t>
+            </a:r>
+            <a:endParaRPr lang="en-US" sz="1000" b="0" dirty="0">
+              <a:solidFill>
+                <a:srgbClr val="F7F1FF"/>
+              </a:solidFill>
+              <a:effectLst/>
+              <a:latin typeface="Consolas" panose="020B0609020204030204" pitchFamily="49" charset="0"/>
+            </a:endParaRPr>
+          </a:p>
+          <a:p>
+            <a:pPr>
+              <a:lnSpc>
+                <a:spcPts val="1425"/>
+              </a:lnSpc>
+              <a:buNone/>
+            </a:pPr>
+            <a:r>
+              <a:rPr lang="en-US" sz="1000" b="0" dirty="0">
+                <a:solidFill>
+                  <a:srgbClr val="F7F1FF"/>
+                </a:solidFill>
+                <a:effectLst/>
+                <a:latin typeface="Consolas" panose="020B0609020204030204" pitchFamily="49" charset="0"/>
+              </a:rPr>
+              <a:t>        </a:t>
+            </a:r>
+            <a:r>
+              <a:rPr lang="en-US" sz="1000" b="0" dirty="0">
+                <a:solidFill>
+                  <a:srgbClr val="8B888F"/>
+                </a:solidFill>
+                <a:effectLst/>
+                <a:latin typeface="Consolas" panose="020B0609020204030204" pitchFamily="49" charset="0"/>
+              </a:rPr>
+              <a:t>"</a:t>
+            </a:r>
+            <a:r>
+              <a:rPr lang="en-US" sz="1000" b="0" dirty="0">
+                <a:solidFill>
+                  <a:srgbClr val="FCE566"/>
+                </a:solidFill>
+                <a:effectLst/>
+                <a:latin typeface="Consolas" panose="020B0609020204030204" pitchFamily="49" charset="0"/>
+              </a:rPr>
+              <a:t>day</a:t>
+            </a:r>
+            <a:r>
+              <a:rPr lang="en-US" sz="1000" b="0" dirty="0">
+                <a:solidFill>
+                  <a:srgbClr val="8B888F"/>
+                </a:solidFill>
+                <a:effectLst/>
+                <a:latin typeface="Consolas" panose="020B0609020204030204" pitchFamily="49" charset="0"/>
+              </a:rPr>
+              <a:t>":</a:t>
+            </a:r>
+            <a:r>
+              <a:rPr lang="en-US" sz="1000" b="0" dirty="0">
+                <a:solidFill>
+                  <a:srgbClr val="F7F1FF"/>
+                </a:solidFill>
+                <a:effectLst/>
+                <a:latin typeface="Consolas" panose="020B0609020204030204" pitchFamily="49" charset="0"/>
+              </a:rPr>
+              <a:t> </a:t>
+            </a:r>
+            <a:r>
+              <a:rPr lang="en-US" sz="1000" b="0" dirty="0">
+                <a:solidFill>
+                  <a:srgbClr val="948AE3"/>
+                </a:solidFill>
+                <a:effectLst/>
+                <a:latin typeface="Consolas" panose="020B0609020204030204" pitchFamily="49" charset="0"/>
+              </a:rPr>
+              <a:t>86400</a:t>
+            </a:r>
+            <a:r>
+              <a:rPr lang="en-US" sz="1000" b="0" dirty="0">
+                <a:solidFill>
+                  <a:srgbClr val="8B888F"/>
+                </a:solidFill>
+                <a:effectLst/>
+                <a:latin typeface="Consolas" panose="020B0609020204030204" pitchFamily="49" charset="0"/>
+              </a:rPr>
+              <a:t>,</a:t>
+            </a:r>
+            <a:endParaRPr lang="en-US" sz="1000" b="0" dirty="0">
+              <a:solidFill>
+                <a:srgbClr val="F7F1FF"/>
+              </a:solidFill>
+              <a:effectLst/>
+              <a:latin typeface="Consolas" panose="020B0609020204030204" pitchFamily="49" charset="0"/>
+            </a:endParaRPr>
+          </a:p>
+          <a:p>
+            <a:pPr>
+              <a:lnSpc>
+                <a:spcPts val="1425"/>
+              </a:lnSpc>
+              <a:buNone/>
+            </a:pPr>
+            <a:r>
+              <a:rPr lang="en-US" sz="1000" b="0" dirty="0">
+                <a:solidFill>
+                  <a:srgbClr val="F7F1FF"/>
+                </a:solidFill>
+                <a:effectLst/>
+                <a:latin typeface="Consolas" panose="020B0609020204030204" pitchFamily="49" charset="0"/>
+              </a:rPr>
+              <a:t>        </a:t>
+            </a:r>
+            <a:r>
+              <a:rPr lang="en-US" sz="1000" b="0" dirty="0">
+                <a:solidFill>
+                  <a:srgbClr val="8B888F"/>
+                </a:solidFill>
+                <a:effectLst/>
+                <a:latin typeface="Consolas" panose="020B0609020204030204" pitchFamily="49" charset="0"/>
+              </a:rPr>
+              <a:t>"</a:t>
+            </a:r>
+            <a:r>
+              <a:rPr lang="en-US" sz="1000" b="0" dirty="0">
+                <a:solidFill>
+                  <a:srgbClr val="FCE566"/>
+                </a:solidFill>
+                <a:effectLst/>
+                <a:latin typeface="Consolas" panose="020B0609020204030204" pitchFamily="49" charset="0"/>
+              </a:rPr>
+              <a:t>half-day</a:t>
+            </a:r>
+            <a:r>
+              <a:rPr lang="en-US" sz="1000" b="0" dirty="0">
+                <a:solidFill>
+                  <a:srgbClr val="8B888F"/>
+                </a:solidFill>
+                <a:effectLst/>
+                <a:latin typeface="Consolas" panose="020B0609020204030204" pitchFamily="49" charset="0"/>
+              </a:rPr>
+              <a:t>":</a:t>
+            </a:r>
+            <a:r>
+              <a:rPr lang="en-US" sz="1000" b="0" dirty="0">
+                <a:solidFill>
+                  <a:srgbClr val="F7F1FF"/>
+                </a:solidFill>
+                <a:effectLst/>
+                <a:latin typeface="Consolas" panose="020B0609020204030204" pitchFamily="49" charset="0"/>
+              </a:rPr>
+              <a:t> </a:t>
+            </a:r>
+            <a:r>
+              <a:rPr lang="en-US" sz="1000" b="0" dirty="0">
+                <a:solidFill>
+                  <a:srgbClr val="948AE3"/>
+                </a:solidFill>
+                <a:effectLst/>
+                <a:latin typeface="Consolas" panose="020B0609020204030204" pitchFamily="49" charset="0"/>
+              </a:rPr>
+              <a:t>43200</a:t>
+            </a:r>
+            <a:r>
+              <a:rPr lang="en-US" sz="1000" b="0" dirty="0">
+                <a:solidFill>
+                  <a:srgbClr val="8B888F"/>
+                </a:solidFill>
+                <a:effectLst/>
+                <a:latin typeface="Consolas" panose="020B0609020204030204" pitchFamily="49" charset="0"/>
+              </a:rPr>
+              <a:t>,</a:t>
+            </a:r>
+            <a:endParaRPr lang="en-US" sz="1000" b="0" dirty="0">
+              <a:solidFill>
+                <a:srgbClr val="F7F1FF"/>
+              </a:solidFill>
+              <a:effectLst/>
+              <a:latin typeface="Consolas" panose="020B0609020204030204" pitchFamily="49" charset="0"/>
+            </a:endParaRPr>
+          </a:p>
+          <a:p>
+            <a:pPr>
+              <a:lnSpc>
+                <a:spcPts val="1425"/>
+              </a:lnSpc>
+              <a:buNone/>
+            </a:pPr>
+            <a:r>
+              <a:rPr lang="en-US" sz="1000" b="0" dirty="0">
+                <a:solidFill>
+                  <a:srgbClr val="F7F1FF"/>
+                </a:solidFill>
+                <a:effectLst/>
+                <a:latin typeface="Consolas" panose="020B0609020204030204" pitchFamily="49" charset="0"/>
+              </a:rPr>
+              <a:t>        </a:t>
+            </a:r>
+            <a:r>
+              <a:rPr lang="en-US" sz="1000" b="0" dirty="0">
+                <a:solidFill>
+                  <a:srgbClr val="8B888F"/>
+                </a:solidFill>
+                <a:effectLst/>
+                <a:latin typeface="Consolas" panose="020B0609020204030204" pitchFamily="49" charset="0"/>
+              </a:rPr>
+              <a:t>"</a:t>
+            </a:r>
+            <a:r>
+              <a:rPr lang="en-US" sz="1000" b="0" dirty="0">
+                <a:solidFill>
+                  <a:srgbClr val="FCE566"/>
+                </a:solidFill>
+                <a:effectLst/>
+                <a:latin typeface="Consolas" panose="020B0609020204030204" pitchFamily="49" charset="0"/>
+              </a:rPr>
+              <a:t>quarter-day</a:t>
+            </a:r>
+            <a:r>
+              <a:rPr lang="en-US" sz="1000" b="0" dirty="0">
+                <a:solidFill>
+                  <a:srgbClr val="8B888F"/>
+                </a:solidFill>
+                <a:effectLst/>
+                <a:latin typeface="Consolas" panose="020B0609020204030204" pitchFamily="49" charset="0"/>
+              </a:rPr>
+              <a:t>":</a:t>
+            </a:r>
+            <a:r>
+              <a:rPr lang="en-US" sz="1000" b="0" dirty="0">
+                <a:solidFill>
+                  <a:srgbClr val="F7F1FF"/>
+                </a:solidFill>
+                <a:effectLst/>
+                <a:latin typeface="Consolas" panose="020B0609020204030204" pitchFamily="49" charset="0"/>
+              </a:rPr>
+              <a:t> </a:t>
+            </a:r>
+            <a:r>
+              <a:rPr lang="en-US" sz="1000" b="0" dirty="0">
+                <a:solidFill>
+                  <a:srgbClr val="948AE3"/>
+                </a:solidFill>
+                <a:effectLst/>
+                <a:latin typeface="Consolas" panose="020B0609020204030204" pitchFamily="49" charset="0"/>
+              </a:rPr>
+              <a:t>21600</a:t>
+            </a:r>
+            <a:r>
+              <a:rPr lang="en-US" sz="1000" b="0" dirty="0">
+                <a:solidFill>
+                  <a:srgbClr val="8B888F"/>
+                </a:solidFill>
+                <a:effectLst/>
+                <a:latin typeface="Consolas" panose="020B0609020204030204" pitchFamily="49" charset="0"/>
+              </a:rPr>
+              <a:t>,</a:t>
+            </a:r>
+            <a:endParaRPr lang="en-US" sz="1000" b="0" dirty="0">
+              <a:solidFill>
+                <a:srgbClr val="F7F1FF"/>
+              </a:solidFill>
+              <a:effectLst/>
+              <a:latin typeface="Consolas" panose="020B0609020204030204" pitchFamily="49" charset="0"/>
+            </a:endParaRPr>
+          </a:p>
+          <a:p>
+            <a:pPr>
+              <a:lnSpc>
+                <a:spcPts val="1425"/>
+              </a:lnSpc>
+              <a:buNone/>
+            </a:pPr>
+            <a:r>
+              <a:rPr lang="en-US" sz="1000" b="0" dirty="0">
+                <a:solidFill>
+                  <a:srgbClr val="F7F1FF"/>
+                </a:solidFill>
+                <a:effectLst/>
+                <a:latin typeface="Consolas" panose="020B0609020204030204" pitchFamily="49" charset="0"/>
+              </a:rPr>
+              <a:t>        </a:t>
+            </a:r>
+            <a:r>
+              <a:rPr lang="en-US" sz="1000" b="0" dirty="0">
+                <a:solidFill>
+                  <a:srgbClr val="8B888F"/>
+                </a:solidFill>
+                <a:effectLst/>
+                <a:latin typeface="Consolas" panose="020B0609020204030204" pitchFamily="49" charset="0"/>
+              </a:rPr>
+              <a:t>"</a:t>
+            </a:r>
+            <a:r>
+              <a:rPr lang="en-US" sz="1000" b="0" dirty="0">
+                <a:solidFill>
+                  <a:srgbClr val="FCE566"/>
+                </a:solidFill>
+                <a:effectLst/>
+                <a:latin typeface="Consolas" panose="020B0609020204030204" pitchFamily="49" charset="0"/>
+              </a:rPr>
+              <a:t>hour</a:t>
+            </a:r>
+            <a:r>
+              <a:rPr lang="en-US" sz="1000" b="0" dirty="0">
+                <a:solidFill>
+                  <a:srgbClr val="8B888F"/>
+                </a:solidFill>
+                <a:effectLst/>
+                <a:latin typeface="Consolas" panose="020B0609020204030204" pitchFamily="49" charset="0"/>
+              </a:rPr>
+              <a:t>":</a:t>
+            </a:r>
+            <a:r>
+              <a:rPr lang="en-US" sz="1000" b="0" dirty="0">
+                <a:solidFill>
+                  <a:srgbClr val="F7F1FF"/>
+                </a:solidFill>
+                <a:effectLst/>
+                <a:latin typeface="Consolas" panose="020B0609020204030204" pitchFamily="49" charset="0"/>
+              </a:rPr>
+              <a:t> </a:t>
+            </a:r>
+            <a:r>
+              <a:rPr lang="en-US" sz="1000" b="0" dirty="0">
+                <a:solidFill>
+                  <a:srgbClr val="948AE3"/>
+                </a:solidFill>
+                <a:effectLst/>
+                <a:latin typeface="Consolas" panose="020B0609020204030204" pitchFamily="49" charset="0"/>
+              </a:rPr>
+              <a:t>3600</a:t>
+            </a:r>
+            <a:r>
+              <a:rPr lang="en-US" sz="1000" b="0" dirty="0">
+                <a:solidFill>
+                  <a:srgbClr val="8B888F"/>
+                </a:solidFill>
+                <a:effectLst/>
+                <a:latin typeface="Consolas" panose="020B0609020204030204" pitchFamily="49" charset="0"/>
+              </a:rPr>
+              <a:t>,</a:t>
+            </a:r>
+            <a:endParaRPr lang="en-US" sz="1000" b="0" dirty="0">
+              <a:solidFill>
+                <a:srgbClr val="F7F1FF"/>
+              </a:solidFill>
+              <a:effectLst/>
+              <a:latin typeface="Consolas" panose="020B0609020204030204" pitchFamily="49" charset="0"/>
+            </a:endParaRPr>
+          </a:p>
+          <a:p>
+            <a:pPr>
+              <a:lnSpc>
+                <a:spcPts val="1425"/>
+              </a:lnSpc>
+              <a:buNone/>
+            </a:pPr>
+            <a:r>
+              <a:rPr lang="en-US" sz="1000" b="0" dirty="0">
+                <a:solidFill>
+                  <a:srgbClr val="F7F1FF"/>
+                </a:solidFill>
+                <a:effectLst/>
+                <a:latin typeface="Consolas" panose="020B0609020204030204" pitchFamily="49" charset="0"/>
+              </a:rPr>
+              <a:t>        </a:t>
+            </a:r>
+            <a:r>
+              <a:rPr lang="en-US" sz="1000" b="0" dirty="0">
+                <a:solidFill>
+                  <a:srgbClr val="8B888F"/>
+                </a:solidFill>
+                <a:effectLst/>
+                <a:latin typeface="Consolas" panose="020B0609020204030204" pitchFamily="49" charset="0"/>
+              </a:rPr>
+              <a:t>"</a:t>
+            </a:r>
+            <a:r>
+              <a:rPr lang="en-US" sz="1000" b="0" dirty="0">
+                <a:solidFill>
+                  <a:srgbClr val="FCE566"/>
+                </a:solidFill>
+                <a:effectLst/>
+                <a:latin typeface="Consolas" panose="020B0609020204030204" pitchFamily="49" charset="0"/>
+              </a:rPr>
+              <a:t>minute</a:t>
+            </a:r>
+            <a:r>
+              <a:rPr lang="en-US" sz="1000" b="0" dirty="0">
+                <a:solidFill>
+                  <a:srgbClr val="8B888F"/>
+                </a:solidFill>
+                <a:effectLst/>
+                <a:latin typeface="Consolas" panose="020B0609020204030204" pitchFamily="49" charset="0"/>
+              </a:rPr>
+              <a:t>":</a:t>
+            </a:r>
+            <a:r>
+              <a:rPr lang="en-US" sz="1000" b="0" dirty="0">
+                <a:solidFill>
+                  <a:srgbClr val="F7F1FF"/>
+                </a:solidFill>
+                <a:effectLst/>
+                <a:latin typeface="Consolas" panose="020B0609020204030204" pitchFamily="49" charset="0"/>
+              </a:rPr>
+              <a:t> </a:t>
+            </a:r>
+            <a:r>
+              <a:rPr lang="en-US" sz="1000" b="0" dirty="0">
+                <a:solidFill>
+                  <a:srgbClr val="948AE3"/>
+                </a:solidFill>
+                <a:effectLst/>
+                <a:latin typeface="Consolas" panose="020B0609020204030204" pitchFamily="49" charset="0"/>
+              </a:rPr>
+              <a:t>60</a:t>
+            </a:r>
+            <a:r>
+              <a:rPr lang="en-US" sz="1000" b="0" dirty="0">
+                <a:solidFill>
+                  <a:srgbClr val="8B888F"/>
+                </a:solidFill>
+                <a:effectLst/>
+                <a:latin typeface="Consolas" panose="020B0609020204030204" pitchFamily="49" charset="0"/>
+              </a:rPr>
+              <a:t>,</a:t>
+            </a:r>
+            <a:endParaRPr lang="en-US" sz="1000" b="0" dirty="0">
+              <a:solidFill>
+                <a:srgbClr val="F7F1FF"/>
+              </a:solidFill>
+              <a:effectLst/>
+              <a:latin typeface="Consolas" panose="020B0609020204030204" pitchFamily="49" charset="0"/>
+            </a:endParaRPr>
+          </a:p>
+          <a:p>
+            <a:pPr>
+              <a:lnSpc>
+                <a:spcPts val="1425"/>
+              </a:lnSpc>
+              <a:buNone/>
+            </a:pPr>
+            <a:r>
+              <a:rPr lang="en-US" sz="1000" b="0" dirty="0">
+                <a:solidFill>
+                  <a:srgbClr val="F7F1FF"/>
+                </a:solidFill>
+                <a:effectLst/>
+                <a:latin typeface="Consolas" panose="020B0609020204030204" pitchFamily="49" charset="0"/>
+              </a:rPr>
+              <a:t>        </a:t>
+            </a:r>
+            <a:r>
+              <a:rPr lang="en-US" sz="1000" b="0" dirty="0">
+                <a:solidFill>
+                  <a:srgbClr val="8B888F"/>
+                </a:solidFill>
+                <a:effectLst/>
+                <a:latin typeface="Consolas" panose="020B0609020204030204" pitchFamily="49" charset="0"/>
+              </a:rPr>
+              <a:t>"</a:t>
+            </a:r>
+            <a:r>
+              <a:rPr lang="en-US" sz="1000" b="0" dirty="0">
+                <a:solidFill>
+                  <a:srgbClr val="FCE566"/>
+                </a:solidFill>
+                <a:effectLst/>
+                <a:latin typeface="Consolas" panose="020B0609020204030204" pitchFamily="49" charset="0"/>
+              </a:rPr>
+              <a:t>second</a:t>
+            </a:r>
+            <a:r>
+              <a:rPr lang="en-US" sz="1000" b="0" dirty="0">
+                <a:solidFill>
+                  <a:srgbClr val="8B888F"/>
+                </a:solidFill>
+                <a:effectLst/>
+                <a:latin typeface="Consolas" panose="020B0609020204030204" pitchFamily="49" charset="0"/>
+              </a:rPr>
+              <a:t>":</a:t>
+            </a:r>
+            <a:r>
+              <a:rPr lang="en-US" sz="1000" b="0" dirty="0">
+                <a:solidFill>
+                  <a:srgbClr val="F7F1FF"/>
+                </a:solidFill>
+                <a:effectLst/>
+                <a:latin typeface="Consolas" panose="020B0609020204030204" pitchFamily="49" charset="0"/>
+              </a:rPr>
+              <a:t> </a:t>
+            </a:r>
+            <a:r>
+              <a:rPr lang="en-US" sz="1000" b="0" dirty="0">
+                <a:solidFill>
+                  <a:srgbClr val="948AE3"/>
+                </a:solidFill>
+                <a:effectLst/>
+                <a:latin typeface="Consolas" panose="020B0609020204030204" pitchFamily="49" charset="0"/>
+              </a:rPr>
+              <a:t>1</a:t>
+            </a:r>
+            <a:endParaRPr lang="en-US" sz="1000" b="0" dirty="0">
+              <a:solidFill>
+                <a:srgbClr val="F7F1FF"/>
+              </a:solidFill>
+              <a:effectLst/>
+              <a:latin typeface="Consolas" panose="020B0609020204030204" pitchFamily="49" charset="0"/>
+            </a:endParaRPr>
+          </a:p>
+          <a:p>
+            <a:pPr>
+              <a:lnSpc>
+                <a:spcPts val="1425"/>
+              </a:lnSpc>
+              <a:buNone/>
+            </a:pPr>
+            <a:r>
+              <a:rPr lang="en-US" sz="1000" b="0" dirty="0">
+                <a:solidFill>
+                  <a:srgbClr val="F7F1FF"/>
+                </a:solidFill>
+                <a:effectLst/>
+                <a:latin typeface="Consolas" panose="020B0609020204030204" pitchFamily="49" charset="0"/>
+              </a:rPr>
+              <a:t>    </a:t>
+            </a:r>
+            <a:r>
+              <a:rPr lang="en-US" sz="1000" b="0" dirty="0">
+                <a:solidFill>
+                  <a:srgbClr val="8B888F"/>
+                </a:solidFill>
+                <a:effectLst/>
+                <a:latin typeface="Consolas" panose="020B0609020204030204" pitchFamily="49" charset="0"/>
+              </a:rPr>
+              <a:t>}</a:t>
+            </a:r>
+            <a:endParaRPr lang="en-US" sz="1000" b="0" dirty="0">
+              <a:solidFill>
+                <a:srgbClr val="F7F1FF"/>
+              </a:solidFill>
+              <a:effectLst/>
+              <a:latin typeface="Consolas" panose="020B0609020204030204" pitchFamily="49" charset="0"/>
+            </a:endParaRPr>
+          </a:p>
+          <a:p>
+            <a:pPr>
+              <a:lnSpc>
+                <a:spcPts val="1425"/>
+              </a:lnSpc>
+            </a:pPr>
+            <a:r>
+              <a:rPr lang="en-US" sz="1000" b="0" dirty="0">
+                <a:solidFill>
+                  <a:srgbClr val="F7F1FF"/>
+                </a:solidFill>
+                <a:effectLst/>
+                <a:latin typeface="Consolas" panose="020B0609020204030204" pitchFamily="49" charset="0"/>
+              </a:rPr>
+              <a:t>    </a:t>
+            </a:r>
+            <a:r>
+              <a:rPr lang="en-US" sz="1000" b="0" dirty="0">
+                <a:solidFill>
+                  <a:srgbClr val="FC618D"/>
+                </a:solidFill>
+                <a:effectLst/>
+                <a:latin typeface="Consolas" panose="020B0609020204030204" pitchFamily="49" charset="0"/>
+              </a:rPr>
+              <a:t>return</a:t>
+            </a:r>
+            <a:r>
+              <a:rPr lang="en-US" sz="1000" b="0" dirty="0">
+                <a:solidFill>
+                  <a:srgbClr val="F7F1FF"/>
+                </a:solidFill>
+                <a:effectLst/>
+                <a:latin typeface="Consolas" panose="020B0609020204030204" pitchFamily="49" charset="0"/>
+              </a:rPr>
+              <a:t> </a:t>
+            </a:r>
+            <a:r>
+              <a:rPr lang="en-US" sz="1000" b="0" dirty="0" err="1">
+                <a:solidFill>
+                  <a:srgbClr val="F7F1FF"/>
+                </a:solidFill>
+                <a:effectLst/>
+                <a:latin typeface="Consolas" panose="020B0609020204030204" pitchFamily="49" charset="0"/>
+              </a:rPr>
+              <a:t>seconds_per_unit</a:t>
+            </a:r>
+            <a:r>
+              <a:rPr lang="en-US" sz="1000" b="0" dirty="0">
+                <a:solidFill>
+                  <a:srgbClr val="8B888F"/>
+                </a:solidFill>
+                <a:effectLst/>
+                <a:latin typeface="Consolas" panose="020B0609020204030204" pitchFamily="49" charset="0"/>
+              </a:rPr>
+              <a:t>[</a:t>
+            </a:r>
+            <a:r>
+              <a:rPr lang="en-US" sz="1000" b="0" dirty="0">
+                <a:solidFill>
+                  <a:srgbClr val="F7F1FF"/>
+                </a:solidFill>
+                <a:effectLst/>
+                <a:latin typeface="Consolas" panose="020B0609020204030204" pitchFamily="49" charset="0"/>
+              </a:rPr>
+              <a:t>unit</a:t>
+            </a:r>
+            <a:r>
+              <a:rPr lang="en-US" sz="1000" b="0" dirty="0">
+                <a:solidFill>
+                  <a:srgbClr val="8B888F"/>
+                </a:solidFill>
+                <a:effectLst/>
+                <a:latin typeface="Consolas" panose="020B0609020204030204" pitchFamily="49" charset="0"/>
+              </a:rPr>
+              <a:t>]</a:t>
+            </a:r>
+            <a:r>
+              <a:rPr lang="en-US" sz="1000" b="0" dirty="0">
+                <a:solidFill>
+                  <a:srgbClr val="F7F1FF"/>
+                </a:solidFill>
+                <a:effectLst/>
+                <a:latin typeface="Consolas" panose="020B0609020204030204" pitchFamily="49" charset="0"/>
+              </a:rPr>
+              <a:t> </a:t>
+            </a:r>
+            <a:r>
+              <a:rPr lang="en-US" sz="1000" b="0" dirty="0">
+                <a:solidFill>
+                  <a:srgbClr val="FC618D"/>
+                </a:solidFill>
+                <a:effectLst/>
+                <a:latin typeface="Consolas" panose="020B0609020204030204" pitchFamily="49" charset="0"/>
+              </a:rPr>
+              <a:t>*</a:t>
+            </a:r>
+            <a:r>
+              <a:rPr lang="en-US" sz="1000" b="0" dirty="0">
+                <a:solidFill>
+                  <a:srgbClr val="F7F1FF"/>
+                </a:solidFill>
+                <a:effectLst/>
+                <a:latin typeface="Consolas" panose="020B0609020204030204" pitchFamily="49" charset="0"/>
+              </a:rPr>
+              <a:t> amount</a:t>
+            </a:r>
+          </a:p>
+          <a:p>
+            <a:pPr>
+              <a:lnSpc>
+                <a:spcPts val="1425"/>
+              </a:lnSpc>
+              <a:buNone/>
+            </a:pPr>
+            <a:endParaRPr lang="en-US" sz="1000" b="0" dirty="0">
+              <a:solidFill>
+                <a:srgbClr val="F7F1FF"/>
+              </a:solidFill>
+              <a:effectLst/>
+              <a:latin typeface="Consolas" panose="020B0609020204030204" pitchFamily="49" charset="0"/>
+            </a:endParaRPr>
           </a:p>
         </p:txBody>
       </p:sp>
     </p:spTree>
     <p:extLst>
       <p:ext uri="{BB962C8B-B14F-4D97-AF65-F5344CB8AC3E}">
-        <p14:creationId xmlns:p14="http://schemas.microsoft.com/office/powerpoint/2010/main" val="2725617119"/>
+        <p14:creationId xmlns:p14="http://schemas.microsoft.com/office/powerpoint/2010/main" val="2393177357"/>
       </p:ext>
     </p:extLst>
   </p:cSld>
@@ -4909,7 +6839,96 @@
 </p:sld>
 </file>
 
-<file path=ppt/slides/slide3.xml><?xml version="1.0" encoding="utf-8"?>
+<file path=ppt/slides/slide4.xml><?xml version="1.0" encoding="utf-8"?>
+<p:sld xmlns:a="http://schemas.openxmlformats.org/drawingml/2006/main" xmlns:r="http://schemas.openxmlformats.org/officeDocument/2006/relationships" xmlns:p="http://schemas.openxmlformats.org/presentationml/2006/main">
+  <p:cSld>
+    <p:spTree>
+      <p:nvGrpSpPr>
+        <p:cNvPr id="1" name=""/>
+        <p:cNvGrpSpPr/>
+        <p:nvPr/>
+      </p:nvGrpSpPr>
+      <p:grpSpPr>
+        <a:xfrm>
+          <a:off x="0" y="0"/>
+          <a:ext cx="0" cy="0"/>
+          <a:chOff x="0" y="0"/>
+          <a:chExt cx="0" cy="0"/>
+        </a:xfrm>
+      </p:grpSpPr>
+      <p:sp>
+        <p:nvSpPr>
+          <p:cNvPr id="2" name="Title 1">
+            <a:extLst>
+              <a:ext uri="{FF2B5EF4-FFF2-40B4-BE49-F238E27FC236}">
+                <a16:creationId xmlns:a16="http://schemas.microsoft.com/office/drawing/2014/main" id="{1E3B2379-50A0-313F-6209-3A0301D27573}"/>
+              </a:ext>
+            </a:extLst>
+          </p:cNvPr>
+          <p:cNvSpPr>
+            <a:spLocks noGrp="1"/>
+          </p:cNvSpPr>
+          <p:nvPr>
+            <p:ph type="title"/>
+          </p:nvPr>
+        </p:nvSpPr>
+        <p:spPr/>
+        <p:txBody>
+          <a:bodyPr/>
+          <a:lstStyle/>
+          <a:p>
+            <a:r>
+              <a:rPr lang="en-US" dirty="0"/>
+              <a:t>2.1 Prompts and summary of input</a:t>
+            </a:r>
+            <a:endParaRPr lang="en-AU" dirty="0"/>
+          </a:p>
+        </p:txBody>
+      </p:sp>
+      <p:pic>
+        <p:nvPicPr>
+          <p:cNvPr id="6" name="Picture 5">
+            <a:extLst>
+              <a:ext uri="{FF2B5EF4-FFF2-40B4-BE49-F238E27FC236}">
+                <a16:creationId xmlns:a16="http://schemas.microsoft.com/office/drawing/2014/main" id="{2408E829-3D58-16D0-6A65-DBAFDA8D683A}"/>
+              </a:ext>
+            </a:extLst>
+          </p:cNvPr>
+          <p:cNvPicPr>
+            <a:picLocks noChangeAspect="1"/>
+          </p:cNvPicPr>
+          <p:nvPr/>
+        </p:nvPicPr>
+        <p:blipFill>
+          <a:blip r:embed="rId2"/>
+          <a:stretch>
+            <a:fillRect/>
+          </a:stretch>
+        </p:blipFill>
+        <p:spPr>
+          <a:xfrm>
+            <a:off x="0" y="2935605"/>
+            <a:ext cx="9144000" cy="3181350"/>
+          </a:xfrm>
+          <a:prstGeom prst="rect">
+            <a:avLst/>
+          </a:prstGeom>
+        </p:spPr>
+      </p:pic>
+    </p:spTree>
+    <p:extLst>
+      <p:ext uri="{BB962C8B-B14F-4D97-AF65-F5344CB8AC3E}">
+        <p14:creationId xmlns:p14="http://schemas.microsoft.com/office/powerpoint/2010/main" val="583537762"/>
+      </p:ext>
+    </p:extLst>
+  </p:cSld>
+  <p:clrMapOvr>
+    <a:masterClrMapping/>
+  </p:clrMapOvr>
+</p:sld>
+</file>
+
+<file path=ppt/slides/slide5.xml><?xml version="1.0" encoding="utf-8"?>
 <p:sld xmlns:a="http://schemas.openxmlformats.org/drawingml/2006/main" xmlns:r="http://schemas.openxmlformats.org/officeDocument/2006/relationships" xmlns:p="http://schemas.openxmlformats.org/presentationml/2006/main">
   <p:cSld>
     <p:spTree>
@@ -6290,7 +8309,7 @@
 </p:sld>
 </file>
 
-<file path=ppt/slides/slide4.xml><?xml version="1.0" encoding="utf-8"?>
+<file path=ppt/slides/slide6.xml><?xml version="1.0" encoding="utf-8"?>
 <p:sld xmlns:a="http://schemas.openxmlformats.org/drawingml/2006/main" xmlns:r="http://schemas.openxmlformats.org/officeDocument/2006/relationships" xmlns:p="http://schemas.openxmlformats.org/presentationml/2006/main">
   <p:cSld>
     <p:spTree>
@@ -6453,7 +8472,7 @@
 </p:sld>
 </file>
 
-<file path=ppt/slides/slide5.xml><?xml version="1.0" encoding="utf-8"?>
+<file path=ppt/slides/slide7.xml><?xml version="1.0" encoding="utf-8"?>
 <p:sld xmlns:a="http://schemas.openxmlformats.org/drawingml/2006/main" xmlns:r="http://schemas.openxmlformats.org/officeDocument/2006/relationships" xmlns:p="http://schemas.openxmlformats.org/presentationml/2006/main">
   <p:cSld>
     <p:spTree>
@@ -6964,7 +8983,7 @@
 </p:sld>
 </file>
 
-<file path=ppt/slides/slide6.xml><?xml version="1.0" encoding="utf-8"?>
+<file path=ppt/slides/slide8.xml><?xml version="1.0" encoding="utf-8"?>
 <p:sld xmlns:a="http://schemas.openxmlformats.org/drawingml/2006/main" xmlns:r="http://schemas.openxmlformats.org/officeDocument/2006/relationships" xmlns:p="http://schemas.openxmlformats.org/presentationml/2006/main">
   <p:cSld>
     <p:bg>
@@ -7249,7 +9268,7 @@
 </p:sld>
 </file>
 
-<file path=ppt/slides/slide7.xml><?xml version="1.0" encoding="utf-8"?>
+<file path=ppt/slides/slide9.xml><?xml version="1.0" encoding="utf-8"?>
 <p:sld xmlns:a="http://schemas.openxmlformats.org/drawingml/2006/main" xmlns:r="http://schemas.openxmlformats.org/officeDocument/2006/relationships" xmlns:p="http://schemas.openxmlformats.org/presentationml/2006/main">
   <p:cSld>
     <p:bg>
@@ -9440,598 +11459,6 @@
 </p:sld>
 </file>
 
-<file path=ppt/slides/slide8.xml><?xml version="1.0" encoding="utf-8"?>
-<p:sld xmlns:a="http://schemas.openxmlformats.org/drawingml/2006/main" xmlns:r="http://schemas.openxmlformats.org/officeDocument/2006/relationships" xmlns:p="http://schemas.openxmlformats.org/presentationml/2006/main">
-  <p:cSld>
-    <p:spTree>
-      <p:nvGrpSpPr>
-        <p:cNvPr id="1" name=""/>
-        <p:cNvGrpSpPr/>
-        <p:nvPr/>
-      </p:nvGrpSpPr>
-      <p:grpSpPr>
-        <a:xfrm>
-          <a:off x="0" y="0"/>
-          <a:ext cx="0" cy="0"/>
-          <a:chOff x="0" y="0"/>
-          <a:chExt cx="0" cy="0"/>
-        </a:xfrm>
-      </p:grpSpPr>
-      <p:sp>
-        <p:nvSpPr>
-          <p:cNvPr id="2" name="Title 1"/>
-          <p:cNvSpPr>
-            <a:spLocks noGrp="1"/>
-          </p:cNvSpPr>
-          <p:nvPr>
-            <p:ph type="title"/>
-          </p:nvPr>
-        </p:nvSpPr>
-        <p:spPr/>
-        <p:txBody>
-          <a:bodyPr>
-            <a:normAutofit fontScale="90000"/>
-          </a:bodyPr>
-          <a:lstStyle/>
-          <a:p>
-            <a:r>
-              <a:t>Module 5: Fission Frequency Simulation</a:t>
-            </a:r>
-          </a:p>
-        </p:txBody>
-      </p:sp>
-      <p:sp>
-        <p:nvSpPr>
-          <p:cNvPr id="4" name="Rectangle 1">
-            <a:extLst>
-              <a:ext uri="{FF2B5EF4-FFF2-40B4-BE49-F238E27FC236}">
-                <a16:creationId xmlns:a16="http://schemas.microsoft.com/office/drawing/2014/main" id="{4F1BA8A6-0D54-C77E-15A9-C1167C69C0CC}"/>
-              </a:ext>
-            </a:extLst>
-          </p:cNvPr>
-          <p:cNvSpPr>
-            <a:spLocks noChangeArrowheads="1"/>
-          </p:cNvSpPr>
-          <p:nvPr/>
-        </p:nvSpPr>
-        <p:spPr bwMode="auto">
-          <a:xfrm>
-            <a:off x="281763" y="1709995"/>
-            <a:ext cx="8580474" cy="3970318"/>
-          </a:xfrm>
-          <a:prstGeom prst="rect">
-            <a:avLst/>
-          </a:prstGeom>
-          <a:noFill/>
-          <a:ln>
-            <a:noFill/>
-          </a:ln>
-          <a:effectLst/>
-          <a:extLst>
-            <a:ext uri="{909E8E84-426E-40DD-AFC4-6F175D3DCCD1}">
-              <a14:hiddenFill xmlns:a14="http://schemas.microsoft.com/office/drawing/2010/main">
-                <a:solidFill>
-                  <a:schemeClr val="accent1"/>
-                </a:solidFill>
-              </a14:hiddenFill>
-            </a:ext>
-            <a:ext uri="{91240B29-F687-4F45-9708-019B960494DF}">
-              <a14:hiddenLine xmlns:a14="http://schemas.microsoft.com/office/drawing/2010/main" w="9525">
-                <a:solidFill>
-                  <a:schemeClr val="tx1"/>
-                </a:solidFill>
-                <a:miter lim="800000"/>
-                <a:headEnd/>
-                <a:tailEnd/>
-              </a14:hiddenLine>
-            </a:ext>
-            <a:ext uri="{AF507438-7753-43E0-B8FC-AC1667EBCBE1}">
-              <a14:hiddenEffects xmlns:a14="http://schemas.microsoft.com/office/drawing/2010/main">
-                <a:effectLst>
-                  <a:outerShdw dist="35921" dir="2700000" algn="ctr" rotWithShape="0">
-                    <a:schemeClr val="bg2"/>
-                  </a:outerShdw>
-                </a:effectLst>
-              </a14:hiddenEffects>
-            </a:ext>
-          </a:extLst>
-        </p:spPr>
-        <p:txBody>
-          <a:bodyPr vert="horz" wrap="square" lIns="91440" tIns="45720" rIns="91440" bIns="45720" numCol="1" anchor="ctr" anchorCtr="0" compatLnSpc="1">
-            <a:prstTxWarp prst="textNoShape">
-              <a:avLst/>
-            </a:prstTxWarp>
-            <a:spAutoFit/>
-          </a:bodyPr>
-          <a:lstStyle/>
-          <a:p>
-            <a:pPr marL="0" marR="0" lvl="0" indent="0" algn="l" defTabSz="914400" rtl="0" eaLnBrk="0" fontAlgn="base" latinLnBrk="0" hangingPunct="0">
-              <a:lnSpc>
-                <a:spcPct val="100000"/>
-              </a:lnSpc>
-              <a:spcBef>
-                <a:spcPct val="0"/>
-              </a:spcBef>
-              <a:spcAft>
-                <a:spcPct val="0"/>
-              </a:spcAft>
-              <a:buClrTx/>
-              <a:buSzTx/>
-              <a:buFontTx/>
-              <a:buNone/>
-              <a:tabLst/>
-            </a:pPr>
-            <a:r>
-              <a:rPr kumimoji="0" lang="en-US" altLang="en-US" sz="1800" b="0" i="0" u="none" strike="noStrike" cap="none" normalizeH="0" baseline="0" dirty="0">
-                <a:ln>
-                  <a:noFill/>
-                </a:ln>
-                <a:solidFill>
-                  <a:schemeClr val="tx1"/>
-                </a:solidFill>
-                <a:effectLst/>
-                <a:latin typeface="Arial" panose="020B0604020202020204" pitchFamily="34" charset="0"/>
-              </a:rPr>
-              <a:t>This module models how population growth changes when the frequency of fission events increases.</a:t>
-            </a:r>
-          </a:p>
-          <a:p>
-            <a:pPr marL="0" marR="0" lvl="0" indent="0" algn="l" defTabSz="914400" rtl="0" eaLnBrk="0" fontAlgn="base" latinLnBrk="0" hangingPunct="0">
-              <a:lnSpc>
-                <a:spcPct val="100000"/>
-              </a:lnSpc>
-              <a:spcBef>
-                <a:spcPct val="0"/>
-              </a:spcBef>
-              <a:spcAft>
-                <a:spcPct val="0"/>
-              </a:spcAft>
-              <a:buClrTx/>
-              <a:buSzTx/>
-              <a:buFontTx/>
-              <a:buChar char="•"/>
-              <a:tabLst/>
-            </a:pPr>
-            <a:r>
-              <a:rPr kumimoji="0" lang="en-US" altLang="en-US" sz="1800" b="0" i="0" u="none" strike="noStrike" cap="none" normalizeH="0" baseline="0" dirty="0">
-                <a:ln>
-                  <a:noFill/>
-                </a:ln>
-                <a:solidFill>
-                  <a:schemeClr val="tx1"/>
-                </a:solidFill>
-                <a:effectLst/>
-                <a:latin typeface="Arial" panose="020B0604020202020204" pitchFamily="34" charset="0"/>
-              </a:rPr>
-              <a:t>The initial population is 1000 and the growth rate is 100% per day.</a:t>
-            </a:r>
-          </a:p>
-          <a:p>
-            <a:pPr marL="0" marR="0" lvl="0" indent="0" algn="l" defTabSz="914400" rtl="0" eaLnBrk="0" fontAlgn="base" latinLnBrk="0" hangingPunct="0">
-              <a:lnSpc>
-                <a:spcPct val="100000"/>
-              </a:lnSpc>
-              <a:spcBef>
-                <a:spcPct val="0"/>
-              </a:spcBef>
-              <a:spcAft>
-                <a:spcPct val="0"/>
-              </a:spcAft>
-              <a:buClrTx/>
-              <a:buSzTx/>
-              <a:buFontTx/>
-              <a:buChar char="•"/>
-              <a:tabLst/>
-            </a:pPr>
-            <a:r>
-              <a:rPr kumimoji="0" lang="en-US" altLang="en-US" sz="1800" b="0" i="0" u="none" strike="noStrike" cap="none" normalizeH="0" baseline="0" dirty="0">
-                <a:ln>
-                  <a:noFill/>
-                </a:ln>
-                <a:solidFill>
-                  <a:schemeClr val="tx1"/>
-                </a:solidFill>
-                <a:effectLst/>
-                <a:latin typeface="Arial" panose="020B0604020202020204" pitchFamily="34" charset="0"/>
-              </a:rPr>
-              <a:t>Fission intervals range from every 6 hours down to every second.</a:t>
-            </a:r>
-          </a:p>
-          <a:p>
-            <a:pPr marL="0" marR="0" lvl="0" indent="0" algn="l" defTabSz="914400" rtl="0" eaLnBrk="0" fontAlgn="base" latinLnBrk="0" hangingPunct="0">
-              <a:lnSpc>
-                <a:spcPct val="100000"/>
-              </a:lnSpc>
-              <a:spcBef>
-                <a:spcPct val="0"/>
-              </a:spcBef>
-              <a:spcAft>
-                <a:spcPct val="0"/>
-              </a:spcAft>
-              <a:buClrTx/>
-              <a:buSzTx/>
-              <a:buFontTx/>
-              <a:buChar char="•"/>
-              <a:tabLst/>
-            </a:pPr>
-            <a:r>
-              <a:rPr kumimoji="0" lang="en-US" altLang="en-US" sz="1800" b="0" i="0" u="none" strike="noStrike" cap="none" normalizeH="0" baseline="0" dirty="0">
-                <a:ln>
-                  <a:noFill/>
-                </a:ln>
-                <a:solidFill>
-                  <a:schemeClr val="tx1"/>
-                </a:solidFill>
-                <a:effectLst/>
-                <a:latin typeface="Arial" panose="020B0604020202020204" pitchFamily="34" charset="0"/>
-              </a:rPr>
-              <a:t>For each interval, the population is updated at that frequency for 1 day.</a:t>
-            </a:r>
-          </a:p>
-          <a:p>
-            <a:pPr marL="0" marR="0" lvl="0" indent="0" algn="l" defTabSz="914400" rtl="0" eaLnBrk="0" fontAlgn="base" latinLnBrk="0" hangingPunct="0">
-              <a:lnSpc>
-                <a:spcPct val="100000"/>
-              </a:lnSpc>
-              <a:spcBef>
-                <a:spcPct val="0"/>
-              </a:spcBef>
-              <a:spcAft>
-                <a:spcPct val="0"/>
-              </a:spcAft>
-              <a:buClrTx/>
-              <a:buSzTx/>
-              <a:buFontTx/>
-              <a:buChar char="•"/>
-              <a:tabLst/>
-            </a:pPr>
-            <a:r>
-              <a:rPr kumimoji="0" lang="en-US" altLang="en-US" sz="1800" b="0" i="0" u="none" strike="noStrike" cap="none" normalizeH="0" baseline="0" dirty="0">
-                <a:ln>
-                  <a:noFill/>
-                </a:ln>
-                <a:solidFill>
-                  <a:schemeClr val="tx1"/>
-                </a:solidFill>
-                <a:effectLst/>
-                <a:latin typeface="Arial" panose="020B0604020202020204" pitchFamily="34" charset="0"/>
-              </a:rPr>
-              <a:t>A compound growth calculation is used at each fission step.</a:t>
-            </a:r>
-          </a:p>
-          <a:p>
-            <a:pPr marL="0" marR="0" lvl="0" indent="0" algn="l" defTabSz="914400" rtl="0" eaLnBrk="0" fontAlgn="base" latinLnBrk="0" hangingPunct="0">
-              <a:lnSpc>
-                <a:spcPct val="100000"/>
-              </a:lnSpc>
-              <a:spcBef>
-                <a:spcPct val="0"/>
-              </a:spcBef>
-              <a:spcAft>
-                <a:spcPct val="0"/>
-              </a:spcAft>
-              <a:buClrTx/>
-              <a:buSzTx/>
-              <a:buFontTx/>
-              <a:buChar char="•"/>
-              <a:tabLst/>
-            </a:pPr>
-            <a:r>
-              <a:rPr kumimoji="0" lang="en-US" altLang="en-US" sz="1800" b="0" i="0" u="none" strike="noStrike" cap="none" normalizeH="0" baseline="0" dirty="0">
-                <a:ln>
-                  <a:noFill/>
-                </a:ln>
-                <a:solidFill>
-                  <a:schemeClr val="tx1"/>
-                </a:solidFill>
-                <a:effectLst/>
-                <a:latin typeface="Arial" panose="020B0604020202020204" pitchFamily="34" charset="0"/>
-              </a:rPr>
-              <a:t>All results are stored and graphed using the module </a:t>
-            </a:r>
-            <a:r>
-              <a:rPr kumimoji="0" lang="en-US" altLang="en-US" sz="1800" b="0" i="0" u="none" strike="noStrike" cap="none" normalizeH="0" baseline="0" dirty="0">
-                <a:ln>
-                  <a:noFill/>
-                </a:ln>
-                <a:solidFill>
-                  <a:schemeClr val="accent6">
-                    <a:lumMod val="75000"/>
-                  </a:schemeClr>
-                </a:solidFill>
-                <a:effectLst/>
-                <a:latin typeface="Arial" panose="020B0604020202020204" pitchFamily="34" charset="0"/>
-              </a:rPr>
-              <a:t>Matplotlib</a:t>
-            </a:r>
-          </a:p>
-          <a:p>
-            <a:pPr marL="0" marR="0" lvl="0" indent="0" algn="l" defTabSz="914400" rtl="0" eaLnBrk="0" fontAlgn="base" latinLnBrk="0" hangingPunct="0">
-              <a:lnSpc>
-                <a:spcPct val="100000"/>
-              </a:lnSpc>
-              <a:spcBef>
-                <a:spcPct val="0"/>
-              </a:spcBef>
-              <a:spcAft>
-                <a:spcPct val="0"/>
-              </a:spcAft>
-              <a:buClrTx/>
-              <a:buSzTx/>
-              <a:buFontTx/>
-              <a:buChar char="•"/>
-              <a:tabLst/>
-            </a:pPr>
-            <a:r>
-              <a:rPr kumimoji="0" lang="en-US" altLang="en-US" sz="1800" b="0" i="0" u="none" strike="noStrike" cap="none" normalizeH="0" baseline="0" dirty="0">
-                <a:ln>
-                  <a:noFill/>
-                </a:ln>
-                <a:solidFill>
-                  <a:schemeClr val="tx1"/>
-                </a:solidFill>
-                <a:effectLst/>
-                <a:latin typeface="Arial" panose="020B0604020202020204" pitchFamily="34" charset="0"/>
-              </a:rPr>
-              <a:t>Graphs show clear trends.</a:t>
-            </a:r>
-          </a:p>
-          <a:p>
-            <a:pPr marL="0" marR="0" lvl="0" indent="0" algn="l" defTabSz="914400" rtl="0" eaLnBrk="0" fontAlgn="base" latinLnBrk="0" hangingPunct="0">
-              <a:lnSpc>
-                <a:spcPct val="100000"/>
-              </a:lnSpc>
-              <a:spcBef>
-                <a:spcPct val="0"/>
-              </a:spcBef>
-              <a:spcAft>
-                <a:spcPct val="0"/>
-              </a:spcAft>
-              <a:buClrTx/>
-              <a:buSzTx/>
-              <a:buFontTx/>
-              <a:buChar char="•"/>
-              <a:tabLst/>
-            </a:pPr>
-            <a:r>
-              <a:rPr kumimoji="0" lang="en-US" altLang="en-US" sz="1800" b="0" i="0" u="none" strike="noStrike" cap="none" normalizeH="0" baseline="0" dirty="0">
-                <a:ln>
-                  <a:noFill/>
-                </a:ln>
-                <a:solidFill>
-                  <a:schemeClr val="tx1"/>
-                </a:solidFill>
-                <a:effectLst/>
-                <a:latin typeface="Arial" panose="020B0604020202020204" pitchFamily="34" charset="0"/>
-              </a:rPr>
-              <a:t>For minute and second intervals, a zoomed-in inset shows how small the individual steps become.</a:t>
-            </a:r>
-          </a:p>
-          <a:p>
-            <a:pPr marL="0" marR="0" lvl="0" indent="0" algn="l" defTabSz="914400" rtl="0" eaLnBrk="0" fontAlgn="base" latinLnBrk="0" hangingPunct="0">
-              <a:lnSpc>
-                <a:spcPct val="100000"/>
-              </a:lnSpc>
-              <a:spcBef>
-                <a:spcPct val="0"/>
-              </a:spcBef>
-              <a:spcAft>
-                <a:spcPct val="0"/>
-              </a:spcAft>
-              <a:buClrTx/>
-              <a:buSzTx/>
-              <a:buFontTx/>
-              <a:buChar char="•"/>
-              <a:tabLst/>
-            </a:pPr>
-            <a:r>
-              <a:rPr kumimoji="0" lang="en-US" altLang="en-US" sz="1800" b="0" i="0" u="none" strike="noStrike" cap="none" normalizeH="0" baseline="0" dirty="0">
-                <a:ln>
-                  <a:noFill/>
-                </a:ln>
-                <a:solidFill>
-                  <a:schemeClr val="tx1"/>
-                </a:solidFill>
-                <a:effectLst/>
-                <a:latin typeface="Arial" panose="020B0604020202020204" pitchFamily="34" charset="0"/>
-              </a:rPr>
-              <a:t>The final population approaches a fixed limit due to continuous compounding.</a:t>
-            </a:r>
-          </a:p>
-          <a:p>
-            <a:pPr marL="0" marR="0" lvl="0" indent="0" algn="l" defTabSz="914400" rtl="0" eaLnBrk="0" fontAlgn="base" latinLnBrk="0" hangingPunct="0">
-              <a:lnSpc>
-                <a:spcPct val="100000"/>
-              </a:lnSpc>
-              <a:spcBef>
-                <a:spcPct val="0"/>
-              </a:spcBef>
-              <a:spcAft>
-                <a:spcPct val="0"/>
-              </a:spcAft>
-              <a:buClrTx/>
-              <a:buSzTx/>
-              <a:buFontTx/>
-              <a:buChar char="•"/>
-              <a:tabLst/>
-            </a:pPr>
-            <a:endParaRPr lang="en-US" altLang="en-US" dirty="0">
-              <a:latin typeface="Arial" panose="020B0604020202020204" pitchFamily="34" charset="0"/>
-            </a:endParaRPr>
-          </a:p>
-          <a:p>
-            <a:pPr marL="0" marR="0" lvl="0" indent="0" algn="l" defTabSz="914400" rtl="0" eaLnBrk="0" fontAlgn="base" latinLnBrk="0" hangingPunct="0">
-              <a:lnSpc>
-                <a:spcPct val="100000"/>
-              </a:lnSpc>
-              <a:spcBef>
-                <a:spcPct val="0"/>
-              </a:spcBef>
-              <a:spcAft>
-                <a:spcPct val="0"/>
-              </a:spcAft>
-              <a:buClrTx/>
-              <a:buSzTx/>
-              <a:buFontTx/>
-              <a:buChar char="•"/>
-              <a:tabLst/>
-            </a:pPr>
-            <a:r>
-              <a:rPr kumimoji="0" lang="en-US" altLang="en-US" sz="1800" b="0" i="0" u="none" strike="noStrike" cap="none" normalizeH="0" baseline="0" dirty="0">
-                <a:ln>
-                  <a:noFill/>
-                </a:ln>
-                <a:solidFill>
-                  <a:schemeClr val="tx1"/>
-                </a:solidFill>
-                <a:effectLst/>
-                <a:latin typeface="Arial" panose="020B0604020202020204" pitchFamily="34" charset="0"/>
-              </a:rPr>
-              <a:t>The only reason </a:t>
-            </a:r>
-            <a:r>
-              <a:rPr kumimoji="0" lang="en-US" altLang="en-US" sz="1800" b="0" i="0" u="none" strike="noStrike" cap="none" normalizeH="0" baseline="0" dirty="0" err="1">
-                <a:ln>
-                  <a:noFill/>
-                </a:ln>
-                <a:solidFill>
-                  <a:schemeClr val="tx1"/>
-                </a:solidFill>
-                <a:effectLst/>
-                <a:latin typeface="Arial" panose="020B0604020202020204" pitchFamily="34" charset="0"/>
-              </a:rPr>
-              <a:t>theres</a:t>
-            </a:r>
-            <a:r>
-              <a:rPr kumimoji="0" lang="en-US" altLang="en-US" sz="1800" b="0" i="0" u="none" strike="noStrike" cap="none" normalizeH="0" baseline="0" dirty="0">
-                <a:ln>
-                  <a:noFill/>
-                </a:ln>
-                <a:solidFill>
-                  <a:schemeClr val="tx1"/>
-                </a:solidFill>
-                <a:effectLst/>
-                <a:latin typeface="Arial" panose="020B0604020202020204" pitchFamily="34" charset="0"/>
-              </a:rPr>
-              <a:t> so many lines in this is because of the graph making</a:t>
-            </a:r>
-          </a:p>
-          <a:p>
-            <a:pPr marL="0" marR="0" lvl="0" indent="0" algn="l" defTabSz="914400" rtl="0" eaLnBrk="0" fontAlgn="base" latinLnBrk="0" hangingPunct="0">
-              <a:lnSpc>
-                <a:spcPct val="100000"/>
-              </a:lnSpc>
-              <a:spcBef>
-                <a:spcPct val="0"/>
-              </a:spcBef>
-              <a:spcAft>
-                <a:spcPct val="0"/>
-              </a:spcAft>
-              <a:buClrTx/>
-              <a:buSzTx/>
-              <a:buFontTx/>
-              <a:buNone/>
-              <a:tabLst/>
-            </a:pPr>
-            <a:endParaRPr kumimoji="0" lang="en-US" altLang="en-US" sz="1800" b="0" i="0" u="none" strike="noStrike" cap="none" normalizeH="0" baseline="0" dirty="0">
-              <a:ln>
-                <a:noFill/>
-              </a:ln>
-              <a:solidFill>
-                <a:schemeClr val="tx1"/>
-              </a:solidFill>
-              <a:effectLst/>
-              <a:latin typeface="Arial" panose="020B0604020202020204" pitchFamily="34" charset="0"/>
-            </a:endParaRPr>
-          </a:p>
-        </p:txBody>
-      </p:sp>
-    </p:spTree>
-  </p:cSld>
-  <p:clrMapOvr>
-    <a:masterClrMapping/>
-  </p:clrMapOvr>
-</p:sld>
-</file>
-
-<file path=ppt/slides/slide9.xml><?xml version="1.0" encoding="utf-8"?>
-<p:sld xmlns:a="http://schemas.openxmlformats.org/drawingml/2006/main" xmlns:r="http://schemas.openxmlformats.org/officeDocument/2006/relationships" xmlns:p="http://schemas.openxmlformats.org/presentationml/2006/main">
-  <p:cSld>
-    <p:spTree>
-      <p:nvGrpSpPr>
-        <p:cNvPr id="1" name=""/>
-        <p:cNvGrpSpPr/>
-        <p:nvPr/>
-      </p:nvGrpSpPr>
-      <p:grpSpPr>
-        <a:xfrm>
-          <a:off x="0" y="0"/>
-          <a:ext cx="0" cy="0"/>
-          <a:chOff x="0" y="0"/>
-          <a:chExt cx="0" cy="0"/>
-        </a:xfrm>
-      </p:grpSpPr>
-      <p:sp>
-        <p:nvSpPr>
-          <p:cNvPr id="2" name="Title 1"/>
-          <p:cNvSpPr>
-            <a:spLocks noGrp="1"/>
-          </p:cNvSpPr>
-          <p:nvPr>
-            <p:ph type="title"/>
-          </p:nvPr>
-        </p:nvSpPr>
-        <p:spPr/>
-        <p:txBody>
-          <a:bodyPr/>
-          <a:lstStyle/>
-          <a:p>
-            <a:r>
-              <a:rPr dirty="0"/>
-              <a:t>Graph: </a:t>
-            </a:r>
-            <a:r>
-              <a:rPr lang="en-US" dirty="0"/>
-              <a:t>Hourly </a:t>
-            </a:r>
-            <a:r>
-              <a:rPr dirty="0"/>
-              <a:t>Fission</a:t>
-            </a:r>
-          </a:p>
-        </p:txBody>
-      </p:sp>
-      <p:pic>
-        <p:nvPicPr>
-          <p:cNvPr id="4" name="Picture 3"/>
-          <p:cNvPicPr>
-            <a:picLocks noChangeAspect="1"/>
-          </p:cNvPicPr>
-          <p:nvPr/>
-        </p:nvPicPr>
-        <p:blipFill>
-          <a:blip r:embed="rId2"/>
-          <a:srcRect/>
-          <a:stretch/>
-        </p:blipFill>
-        <p:spPr>
-          <a:xfrm>
-            <a:off x="265813" y="1562986"/>
-            <a:ext cx="8420987" cy="4210492"/>
-          </a:xfrm>
-          <a:prstGeom prst="rect">
-            <a:avLst/>
-          </a:prstGeom>
-        </p:spPr>
-      </p:pic>
-    </p:spTree>
-  </p:cSld>
-  <p:clrMapOvr>
-    <a:masterClrMapping/>
-  </p:clrMapOvr>
-</p:sld>
-</file>
-
 <file path=ppt/theme/theme1.xml><?xml version="1.0" encoding="utf-8"?>
 <a:theme xmlns:a="http://schemas.openxmlformats.org/drawingml/2006/main" name="Office Theme">
   <a:themeElements>

</xml_diff>